<commit_message>
Work on PPP, DG, UG and refactor Log/in/out
</commit_message>
<xml_diff>
--- a/docs/diagrams/HighLevelSequenceDiagrams.pptx
+++ b/docs/diagrams/HighLevelSequenceDiagrams.pptx
@@ -5,10 +5,11 @@
     <p:sldMasterId id="2147483648" r:id="rId1"/>
   </p:sldMasterIdLst>
   <p:notesMasterIdLst>
-    <p:notesMasterId r:id="rId3"/>
+    <p:notesMasterId r:id="rId4"/>
   </p:notesMasterIdLst>
   <p:sldIdLst>
     <p:sldId id="266" r:id="rId2"/>
+    <p:sldId id="267" r:id="rId3"/>
   </p:sldIdLst>
   <p:sldSz cx="9144000" cy="6858000" type="screen4x3"/>
   <p:notesSz cx="6858000" cy="9144000"/>
@@ -107,6 +108,22 @@
       </a:defRPr>
     </a:lvl9pPr>
   </p:defaultTextStyle>
+  <p:extLst>
+    <p:ext uri="{EFAFB233-063F-42B5-8137-9DF3F51BA10A}">
+      <p15:sldGuideLst xmlns:p15="http://schemas.microsoft.com/office/powerpoint/2012/main">
+        <p15:guide id="1" orient="horz" pos="1488">
+          <p15:clr>
+            <a:srgbClr val="A4A3A4"/>
+          </p15:clr>
+        </p15:guide>
+        <p15:guide id="2" pos="2880">
+          <p15:clr>
+            <a:srgbClr val="A4A3A4"/>
+          </p15:clr>
+        </p15:guide>
+      </p15:sldGuideLst>
+    </p:ext>
+  </p:extLst>
 </p:presentation>
 </file>
 
@@ -192,7 +209,7 @@
           <a:p>
             <a:fld id="{F5CC4B3F-88C1-4FFA-B1B6-F41C21DC6924}" type="datetimeFigureOut">
               <a:rPr lang="en-US" smtClean="0"/>
-              <a:t>10/16/2016</a:t>
+              <a:t>11/9/2018</a:t>
             </a:fld>
             <a:endParaRPr lang="en-US"/>
           </a:p>
@@ -256,38 +273,37 @@
           <a:p>
             <a:pPr lvl="0"/>
             <a:r>
-              <a:rPr lang="en-US" smtClean="0"/>
+              <a:rPr lang="en-US"/>
               <a:t>Click to edit Master text styles</a:t>
             </a:r>
           </a:p>
           <a:p>
             <a:pPr lvl="1"/>
             <a:r>
-              <a:rPr lang="en-US" smtClean="0"/>
+              <a:rPr lang="en-US"/>
               <a:t>Second level</a:t>
             </a:r>
           </a:p>
           <a:p>
             <a:pPr lvl="2"/>
             <a:r>
-              <a:rPr lang="en-US" smtClean="0"/>
+              <a:rPr lang="en-US"/>
               <a:t>Third level</a:t>
             </a:r>
           </a:p>
           <a:p>
             <a:pPr lvl="3"/>
             <a:r>
-              <a:rPr lang="en-US" smtClean="0"/>
+              <a:rPr lang="en-US"/>
               <a:t>Fourth level</a:t>
             </a:r>
           </a:p>
           <a:p>
             <a:pPr lvl="4"/>
             <a:r>
-              <a:rPr lang="en-US" smtClean="0"/>
+              <a:rPr lang="en-US"/>
               <a:t>Fifth level</a:t>
             </a:r>
-            <a:endParaRPr lang="en-US"/>
           </a:p>
         </p:txBody>
       </p:sp>
@@ -498,10 +514,9 @@
           <a:lstStyle/>
           <a:p>
             <a:r>
-              <a:rPr lang="en-US" smtClean="0"/>
+              <a:rPr lang="en-US"/>
               <a:t>Click to edit Master title style</a:t>
             </a:r>
-            <a:endParaRPr lang="en-US"/>
           </a:p>
         </p:txBody>
       </p:sp>
@@ -617,10 +632,9 @@
           </a:lstStyle>
           <a:p>
             <a:r>
-              <a:rPr lang="en-US" smtClean="0"/>
+              <a:rPr lang="en-US"/>
               <a:t>Click to edit Master subtitle style</a:t>
             </a:r>
-            <a:endParaRPr lang="en-US"/>
           </a:p>
         </p:txBody>
       </p:sp>
@@ -641,7 +655,7 @@
           <a:p>
             <a:fld id="{78C97017-6FC3-485B-9764-EAC9E56C1D49}" type="datetimeFigureOut">
               <a:rPr lang="en-US" smtClean="0"/>
-              <a:t>10/16/2016</a:t>
+              <a:t>11/9/2018</a:t>
             </a:fld>
             <a:endParaRPr lang="en-US"/>
           </a:p>
@@ -735,10 +749,9 @@
           <a:lstStyle/>
           <a:p>
             <a:r>
-              <a:rPr lang="en-US" smtClean="0"/>
+              <a:rPr lang="en-US"/>
               <a:t>Click to edit Master title style</a:t>
             </a:r>
-            <a:endParaRPr lang="en-US"/>
           </a:p>
         </p:txBody>
       </p:sp>
@@ -759,38 +772,37 @@
           <a:p>
             <a:pPr lvl="0"/>
             <a:r>
-              <a:rPr lang="en-US" smtClean="0"/>
+              <a:rPr lang="en-US"/>
               <a:t>Click to edit Master text styles</a:t>
             </a:r>
           </a:p>
           <a:p>
             <a:pPr lvl="1"/>
             <a:r>
-              <a:rPr lang="en-US" smtClean="0"/>
+              <a:rPr lang="en-US"/>
               <a:t>Second level</a:t>
             </a:r>
           </a:p>
           <a:p>
             <a:pPr lvl="2"/>
             <a:r>
-              <a:rPr lang="en-US" smtClean="0"/>
+              <a:rPr lang="en-US"/>
               <a:t>Third level</a:t>
             </a:r>
           </a:p>
           <a:p>
             <a:pPr lvl="3"/>
             <a:r>
-              <a:rPr lang="en-US" smtClean="0"/>
+              <a:rPr lang="en-US"/>
               <a:t>Fourth level</a:t>
             </a:r>
           </a:p>
           <a:p>
             <a:pPr lvl="4"/>
             <a:r>
-              <a:rPr lang="en-US" smtClean="0"/>
+              <a:rPr lang="en-US"/>
               <a:t>Fifth level</a:t>
             </a:r>
-            <a:endParaRPr lang="en-US"/>
           </a:p>
         </p:txBody>
       </p:sp>
@@ -811,7 +823,7 @@
           <a:p>
             <a:fld id="{78C97017-6FC3-485B-9764-EAC9E56C1D49}" type="datetimeFigureOut">
               <a:rPr lang="en-US" smtClean="0"/>
-              <a:t>10/16/2016</a:t>
+              <a:t>11/9/2018</a:t>
             </a:fld>
             <a:endParaRPr lang="en-US"/>
           </a:p>
@@ -910,10 +922,9 @@
           <a:lstStyle/>
           <a:p>
             <a:r>
-              <a:rPr lang="en-US" smtClean="0"/>
+              <a:rPr lang="en-US"/>
               <a:t>Click to edit Master title style</a:t>
             </a:r>
-            <a:endParaRPr lang="en-US"/>
           </a:p>
         </p:txBody>
       </p:sp>
@@ -939,38 +950,37 @@
           <a:p>
             <a:pPr lvl="0"/>
             <a:r>
-              <a:rPr lang="en-US" smtClean="0"/>
+              <a:rPr lang="en-US"/>
               <a:t>Click to edit Master text styles</a:t>
             </a:r>
           </a:p>
           <a:p>
             <a:pPr lvl="1"/>
             <a:r>
-              <a:rPr lang="en-US" smtClean="0"/>
+              <a:rPr lang="en-US"/>
               <a:t>Second level</a:t>
             </a:r>
           </a:p>
           <a:p>
             <a:pPr lvl="2"/>
             <a:r>
-              <a:rPr lang="en-US" smtClean="0"/>
+              <a:rPr lang="en-US"/>
               <a:t>Third level</a:t>
             </a:r>
           </a:p>
           <a:p>
             <a:pPr lvl="3"/>
             <a:r>
-              <a:rPr lang="en-US" smtClean="0"/>
+              <a:rPr lang="en-US"/>
               <a:t>Fourth level</a:t>
             </a:r>
           </a:p>
           <a:p>
             <a:pPr lvl="4"/>
             <a:r>
-              <a:rPr lang="en-US" smtClean="0"/>
+              <a:rPr lang="en-US"/>
               <a:t>Fifth level</a:t>
             </a:r>
-            <a:endParaRPr lang="en-US"/>
           </a:p>
         </p:txBody>
       </p:sp>
@@ -991,7 +1001,7 @@
           <a:p>
             <a:fld id="{78C97017-6FC3-485B-9764-EAC9E56C1D49}" type="datetimeFigureOut">
               <a:rPr lang="en-US" smtClean="0"/>
-              <a:t>10/16/2016</a:t>
+              <a:t>11/9/2018</a:t>
             </a:fld>
             <a:endParaRPr lang="en-US"/>
           </a:p>
@@ -1085,10 +1095,9 @@
           <a:lstStyle/>
           <a:p>
             <a:r>
-              <a:rPr lang="en-US" smtClean="0"/>
+              <a:rPr lang="en-US"/>
               <a:t>Click to edit Master title style</a:t>
             </a:r>
-            <a:endParaRPr lang="en-US"/>
           </a:p>
         </p:txBody>
       </p:sp>
@@ -1109,38 +1118,37 @@
           <a:p>
             <a:pPr lvl="0"/>
             <a:r>
-              <a:rPr lang="en-US" smtClean="0"/>
+              <a:rPr lang="en-US"/>
               <a:t>Click to edit Master text styles</a:t>
             </a:r>
           </a:p>
           <a:p>
             <a:pPr lvl="1"/>
             <a:r>
-              <a:rPr lang="en-US" smtClean="0"/>
+              <a:rPr lang="en-US"/>
               <a:t>Second level</a:t>
             </a:r>
           </a:p>
           <a:p>
             <a:pPr lvl="2"/>
             <a:r>
-              <a:rPr lang="en-US" smtClean="0"/>
+              <a:rPr lang="en-US"/>
               <a:t>Third level</a:t>
             </a:r>
           </a:p>
           <a:p>
             <a:pPr lvl="3"/>
             <a:r>
-              <a:rPr lang="en-US" smtClean="0"/>
+              <a:rPr lang="en-US"/>
               <a:t>Fourth level</a:t>
             </a:r>
           </a:p>
           <a:p>
             <a:pPr lvl="4"/>
             <a:r>
-              <a:rPr lang="en-US" smtClean="0"/>
+              <a:rPr lang="en-US"/>
               <a:t>Fifth level</a:t>
             </a:r>
-            <a:endParaRPr lang="en-US"/>
           </a:p>
         </p:txBody>
       </p:sp>
@@ -1161,7 +1169,7 @@
           <a:p>
             <a:fld id="{78C97017-6FC3-485B-9764-EAC9E56C1D49}" type="datetimeFigureOut">
               <a:rPr lang="en-US" smtClean="0"/>
-              <a:t>10/16/2016</a:t>
+              <a:t>11/9/2018</a:t>
             </a:fld>
             <a:endParaRPr lang="en-US"/>
           </a:p>
@@ -1264,10 +1272,9 @@
           </a:lstStyle>
           <a:p>
             <a:r>
-              <a:rPr lang="en-US" smtClean="0"/>
+              <a:rPr lang="en-US"/>
               <a:t>Click to edit Master title style</a:t>
             </a:r>
-            <a:endParaRPr lang="en-US"/>
           </a:p>
         </p:txBody>
       </p:sp>
@@ -1384,7 +1391,7 @@
           <a:p>
             <a:pPr lvl="0"/>
             <a:r>
-              <a:rPr lang="en-US" smtClean="0"/>
+              <a:rPr lang="en-US"/>
               <a:t>Click to edit Master text styles</a:t>
             </a:r>
           </a:p>
@@ -1407,7 +1414,7 @@
           <a:p>
             <a:fld id="{78C97017-6FC3-485B-9764-EAC9E56C1D49}" type="datetimeFigureOut">
               <a:rPr lang="en-US" smtClean="0"/>
-              <a:t>10/16/2016</a:t>
+              <a:t>11/9/2018</a:t>
             </a:fld>
             <a:endParaRPr lang="en-US"/>
           </a:p>
@@ -1501,10 +1508,9 @@
           <a:lstStyle/>
           <a:p>
             <a:r>
-              <a:rPr lang="en-US" smtClean="0"/>
+              <a:rPr lang="en-US"/>
               <a:t>Click to edit Master title style</a:t>
             </a:r>
-            <a:endParaRPr lang="en-US"/>
           </a:p>
         </p:txBody>
       </p:sp>
@@ -1558,38 +1564,37 @@
           <a:p>
             <a:pPr lvl="0"/>
             <a:r>
-              <a:rPr lang="en-US" smtClean="0"/>
+              <a:rPr lang="en-US"/>
               <a:t>Click to edit Master text styles</a:t>
             </a:r>
           </a:p>
           <a:p>
             <a:pPr lvl="1"/>
             <a:r>
-              <a:rPr lang="en-US" smtClean="0"/>
+              <a:rPr lang="en-US"/>
               <a:t>Second level</a:t>
             </a:r>
           </a:p>
           <a:p>
             <a:pPr lvl="2"/>
             <a:r>
-              <a:rPr lang="en-US" smtClean="0"/>
+              <a:rPr lang="en-US"/>
               <a:t>Third level</a:t>
             </a:r>
           </a:p>
           <a:p>
             <a:pPr lvl="3"/>
             <a:r>
-              <a:rPr lang="en-US" smtClean="0"/>
+              <a:rPr lang="en-US"/>
               <a:t>Fourth level</a:t>
             </a:r>
           </a:p>
           <a:p>
             <a:pPr lvl="4"/>
             <a:r>
-              <a:rPr lang="en-US" smtClean="0"/>
+              <a:rPr lang="en-US"/>
               <a:t>Fifth level</a:t>
             </a:r>
-            <a:endParaRPr lang="en-US"/>
           </a:p>
         </p:txBody>
       </p:sp>
@@ -1643,38 +1648,37 @@
           <a:p>
             <a:pPr lvl="0"/>
             <a:r>
-              <a:rPr lang="en-US" smtClean="0"/>
+              <a:rPr lang="en-US"/>
               <a:t>Click to edit Master text styles</a:t>
             </a:r>
           </a:p>
           <a:p>
             <a:pPr lvl="1"/>
             <a:r>
-              <a:rPr lang="en-US" smtClean="0"/>
+              <a:rPr lang="en-US"/>
               <a:t>Second level</a:t>
             </a:r>
           </a:p>
           <a:p>
             <a:pPr lvl="2"/>
             <a:r>
-              <a:rPr lang="en-US" smtClean="0"/>
+              <a:rPr lang="en-US"/>
               <a:t>Third level</a:t>
             </a:r>
           </a:p>
           <a:p>
             <a:pPr lvl="3"/>
             <a:r>
-              <a:rPr lang="en-US" smtClean="0"/>
+              <a:rPr lang="en-US"/>
               <a:t>Fourth level</a:t>
             </a:r>
           </a:p>
           <a:p>
             <a:pPr lvl="4"/>
             <a:r>
-              <a:rPr lang="en-US" smtClean="0"/>
+              <a:rPr lang="en-US"/>
               <a:t>Fifth level</a:t>
             </a:r>
-            <a:endParaRPr lang="en-US"/>
           </a:p>
         </p:txBody>
       </p:sp>
@@ -1695,7 +1699,7 @@
           <a:p>
             <a:fld id="{78C97017-6FC3-485B-9764-EAC9E56C1D49}" type="datetimeFigureOut">
               <a:rPr lang="en-US" smtClean="0"/>
-              <a:t>10/16/2016</a:t>
+              <a:t>11/9/2018</a:t>
             </a:fld>
             <a:endParaRPr lang="en-US"/>
           </a:p>
@@ -1793,10 +1797,9 @@
           </a:lstStyle>
           <a:p>
             <a:r>
-              <a:rPr lang="en-US" smtClean="0"/>
+              <a:rPr lang="en-US"/>
               <a:t>Click to edit Master title style</a:t>
             </a:r>
-            <a:endParaRPr lang="en-US"/>
           </a:p>
         </p:txBody>
       </p:sp>
@@ -1859,7 +1862,7 @@
           <a:p>
             <a:pPr lvl="0"/>
             <a:r>
-              <a:rPr lang="en-US" smtClean="0"/>
+              <a:rPr lang="en-US"/>
               <a:t>Click to edit Master text styles</a:t>
             </a:r>
           </a:p>
@@ -1915,38 +1918,37 @@
           <a:p>
             <a:pPr lvl="0"/>
             <a:r>
-              <a:rPr lang="en-US" smtClean="0"/>
+              <a:rPr lang="en-US"/>
               <a:t>Click to edit Master text styles</a:t>
             </a:r>
           </a:p>
           <a:p>
             <a:pPr lvl="1"/>
             <a:r>
-              <a:rPr lang="en-US" smtClean="0"/>
+              <a:rPr lang="en-US"/>
               <a:t>Second level</a:t>
             </a:r>
           </a:p>
           <a:p>
             <a:pPr lvl="2"/>
             <a:r>
-              <a:rPr lang="en-US" smtClean="0"/>
+              <a:rPr lang="en-US"/>
               <a:t>Third level</a:t>
             </a:r>
           </a:p>
           <a:p>
             <a:pPr lvl="3"/>
             <a:r>
-              <a:rPr lang="en-US" smtClean="0"/>
+              <a:rPr lang="en-US"/>
               <a:t>Fourth level</a:t>
             </a:r>
           </a:p>
           <a:p>
             <a:pPr lvl="4"/>
             <a:r>
-              <a:rPr lang="en-US" smtClean="0"/>
+              <a:rPr lang="en-US"/>
               <a:t>Fifth level</a:t>
             </a:r>
-            <a:endParaRPr lang="en-US"/>
           </a:p>
         </p:txBody>
       </p:sp>
@@ -2009,7 +2011,7 @@
           <a:p>
             <a:pPr lvl="0"/>
             <a:r>
-              <a:rPr lang="en-US" smtClean="0"/>
+              <a:rPr lang="en-US"/>
               <a:t>Click to edit Master text styles</a:t>
             </a:r>
           </a:p>
@@ -2065,38 +2067,37 @@
           <a:p>
             <a:pPr lvl="0"/>
             <a:r>
-              <a:rPr lang="en-US" smtClean="0"/>
+              <a:rPr lang="en-US"/>
               <a:t>Click to edit Master text styles</a:t>
             </a:r>
           </a:p>
           <a:p>
             <a:pPr lvl="1"/>
             <a:r>
-              <a:rPr lang="en-US" smtClean="0"/>
+              <a:rPr lang="en-US"/>
               <a:t>Second level</a:t>
             </a:r>
           </a:p>
           <a:p>
             <a:pPr lvl="2"/>
             <a:r>
-              <a:rPr lang="en-US" smtClean="0"/>
+              <a:rPr lang="en-US"/>
               <a:t>Third level</a:t>
             </a:r>
           </a:p>
           <a:p>
             <a:pPr lvl="3"/>
             <a:r>
-              <a:rPr lang="en-US" smtClean="0"/>
+              <a:rPr lang="en-US"/>
               <a:t>Fourth level</a:t>
             </a:r>
           </a:p>
           <a:p>
             <a:pPr lvl="4"/>
             <a:r>
-              <a:rPr lang="en-US" smtClean="0"/>
+              <a:rPr lang="en-US"/>
               <a:t>Fifth level</a:t>
             </a:r>
-            <a:endParaRPr lang="en-US"/>
           </a:p>
         </p:txBody>
       </p:sp>
@@ -2117,7 +2118,7 @@
           <a:p>
             <a:fld id="{78C97017-6FC3-485B-9764-EAC9E56C1D49}" type="datetimeFigureOut">
               <a:rPr lang="en-US" smtClean="0"/>
-              <a:t>10/16/2016</a:t>
+              <a:t>11/9/2018</a:t>
             </a:fld>
             <a:endParaRPr lang="en-US"/>
           </a:p>
@@ -2211,10 +2212,9 @@
           <a:lstStyle/>
           <a:p>
             <a:r>
-              <a:rPr lang="en-US" smtClean="0"/>
+              <a:rPr lang="en-US"/>
               <a:t>Click to edit Master title style</a:t>
             </a:r>
-            <a:endParaRPr lang="en-US"/>
           </a:p>
         </p:txBody>
       </p:sp>
@@ -2235,7 +2235,7 @@
           <a:p>
             <a:fld id="{78C97017-6FC3-485B-9764-EAC9E56C1D49}" type="datetimeFigureOut">
               <a:rPr lang="en-US" smtClean="0"/>
-              <a:t>10/16/2016</a:t>
+              <a:t>11/9/2018</a:t>
             </a:fld>
             <a:endParaRPr lang="en-US"/>
           </a:p>
@@ -2330,7 +2330,7 @@
           <a:p>
             <a:fld id="{78C97017-6FC3-485B-9764-EAC9E56C1D49}" type="datetimeFigureOut">
               <a:rPr lang="en-US" smtClean="0"/>
-              <a:t>10/16/2016</a:t>
+              <a:t>11/9/2018</a:t>
             </a:fld>
             <a:endParaRPr lang="en-US"/>
           </a:p>
@@ -2433,10 +2433,9 @@
           </a:lstStyle>
           <a:p>
             <a:r>
-              <a:rPr lang="en-US" smtClean="0"/>
+              <a:rPr lang="en-US"/>
               <a:t>Click to edit Master title style</a:t>
             </a:r>
-            <a:endParaRPr lang="en-US"/>
           </a:p>
         </p:txBody>
       </p:sp>
@@ -2490,38 +2489,37 @@
           <a:p>
             <a:pPr lvl="0"/>
             <a:r>
-              <a:rPr lang="en-US" smtClean="0"/>
+              <a:rPr lang="en-US"/>
               <a:t>Click to edit Master text styles</a:t>
             </a:r>
           </a:p>
           <a:p>
             <a:pPr lvl="1"/>
             <a:r>
-              <a:rPr lang="en-US" smtClean="0"/>
+              <a:rPr lang="en-US"/>
               <a:t>Second level</a:t>
             </a:r>
           </a:p>
           <a:p>
             <a:pPr lvl="2"/>
             <a:r>
-              <a:rPr lang="en-US" smtClean="0"/>
+              <a:rPr lang="en-US"/>
               <a:t>Third level</a:t>
             </a:r>
           </a:p>
           <a:p>
             <a:pPr lvl="3"/>
             <a:r>
-              <a:rPr lang="en-US" smtClean="0"/>
+              <a:rPr lang="en-US"/>
               <a:t>Fourth level</a:t>
             </a:r>
           </a:p>
           <a:p>
             <a:pPr lvl="4"/>
             <a:r>
-              <a:rPr lang="en-US" smtClean="0"/>
+              <a:rPr lang="en-US"/>
               <a:t>Fifth level</a:t>
             </a:r>
-            <a:endParaRPr lang="en-US"/>
           </a:p>
         </p:txBody>
       </p:sp>
@@ -2584,7 +2582,7 @@
           <a:p>
             <a:pPr lvl="0"/>
             <a:r>
-              <a:rPr lang="en-US" smtClean="0"/>
+              <a:rPr lang="en-US"/>
               <a:t>Click to edit Master text styles</a:t>
             </a:r>
           </a:p>
@@ -2607,7 +2605,7 @@
           <a:p>
             <a:fld id="{78C97017-6FC3-485B-9764-EAC9E56C1D49}" type="datetimeFigureOut">
               <a:rPr lang="en-US" smtClean="0"/>
-              <a:t>10/16/2016</a:t>
+              <a:t>11/9/2018</a:t>
             </a:fld>
             <a:endParaRPr lang="en-US"/>
           </a:p>
@@ -2710,10 +2708,9 @@
           </a:lstStyle>
           <a:p>
             <a:r>
-              <a:rPr lang="en-US" smtClean="0"/>
+              <a:rPr lang="en-US"/>
               <a:t>Click to edit Master title style</a:t>
             </a:r>
-            <a:endParaRPr lang="en-US"/>
           </a:p>
         </p:txBody>
       </p:sp>
@@ -2837,7 +2834,7 @@
           <a:p>
             <a:pPr lvl="0"/>
             <a:r>
-              <a:rPr lang="en-US" smtClean="0"/>
+              <a:rPr lang="en-US"/>
               <a:t>Click to edit Master text styles</a:t>
             </a:r>
           </a:p>
@@ -2860,7 +2857,7 @@
           <a:p>
             <a:fld id="{78C97017-6FC3-485B-9764-EAC9E56C1D49}" type="datetimeFigureOut">
               <a:rPr lang="en-US" smtClean="0"/>
-              <a:t>10/16/2016</a:t>
+              <a:t>11/9/2018</a:t>
             </a:fld>
             <a:endParaRPr lang="en-US"/>
           </a:p>
@@ -2969,10 +2966,9 @@
           <a:lstStyle/>
           <a:p>
             <a:r>
-              <a:rPr lang="en-US" smtClean="0"/>
+              <a:rPr lang="en-US"/>
               <a:t>Click to edit Master title style</a:t>
             </a:r>
-            <a:endParaRPr lang="en-US"/>
           </a:p>
         </p:txBody>
       </p:sp>
@@ -3003,38 +2999,37 @@
           <a:p>
             <a:pPr lvl="0"/>
             <a:r>
-              <a:rPr lang="en-US" smtClean="0"/>
+              <a:rPr lang="en-US"/>
               <a:t>Click to edit Master text styles</a:t>
             </a:r>
           </a:p>
           <a:p>
             <a:pPr lvl="1"/>
             <a:r>
-              <a:rPr lang="en-US" smtClean="0"/>
+              <a:rPr lang="en-US"/>
               <a:t>Second level</a:t>
             </a:r>
           </a:p>
           <a:p>
             <a:pPr lvl="2"/>
             <a:r>
-              <a:rPr lang="en-US" smtClean="0"/>
+              <a:rPr lang="en-US"/>
               <a:t>Third level</a:t>
             </a:r>
           </a:p>
           <a:p>
             <a:pPr lvl="3"/>
             <a:r>
-              <a:rPr lang="en-US" smtClean="0"/>
+              <a:rPr lang="en-US"/>
               <a:t>Fourth level</a:t>
             </a:r>
           </a:p>
           <a:p>
             <a:pPr lvl="4"/>
             <a:r>
-              <a:rPr lang="en-US" smtClean="0"/>
+              <a:rPr lang="en-US"/>
               <a:t>Fifth level</a:t>
             </a:r>
-            <a:endParaRPr lang="en-US"/>
           </a:p>
         </p:txBody>
       </p:sp>
@@ -3073,7 +3068,7 @@
           <a:p>
             <a:fld id="{78C97017-6FC3-485B-9764-EAC9E56C1D49}" type="datetimeFigureOut">
               <a:rPr lang="en-US" smtClean="0"/>
-              <a:t>10/16/2016</a:t>
+              <a:t>11/9/2018</a:t>
             </a:fld>
             <a:endParaRPr lang="en-US"/>
           </a:p>
@@ -3492,7 +3487,7 @@
           <a:p>
             <a:pPr algn="ctr"/>
             <a:r>
-              <a:rPr lang="en-US" sz="1600" dirty="0" smtClean="0">
+              <a:rPr lang="en-US" sz="1600" dirty="0">
                 <a:solidFill>
                   <a:schemeClr val="bg1"/>
                 </a:solidFill>
@@ -3856,7 +3851,7 @@
           <a:p>
             <a:pPr algn="ctr"/>
             <a:r>
-              <a:rPr lang="en-US" sz="1600" dirty="0" smtClean="0">
+              <a:rPr lang="en-US" sz="1600" dirty="0">
                 <a:solidFill>
                   <a:schemeClr val="bg1"/>
                 </a:solidFill>
@@ -4003,7 +3998,7 @@
           <a:p>
             <a:pPr algn="ctr"/>
             <a:r>
-              <a:rPr lang="en-US" sz="1600" dirty="0" smtClean="0">
+              <a:rPr lang="en-US" sz="1600" dirty="0">
                 <a:solidFill>
                   <a:schemeClr val="bg1"/>
                 </a:solidFill>
@@ -4165,10 +4160,9 @@
           <a:lstStyle/>
           <a:p>
             <a:r>
-              <a:rPr lang="en-US" sz="1400" dirty="0" smtClean="0"/>
+              <a:rPr lang="en-US" sz="1400" dirty="0"/>
               <a:t>delete 1</a:t>
             </a:r>
-            <a:endParaRPr lang="en-US" sz="1400" dirty="0"/>
           </a:p>
         </p:txBody>
       </p:sp>
@@ -4231,18 +4225,13 @@
           <a:lstStyle/>
           <a:p>
             <a:r>
-              <a:rPr lang="en-US" sz="1400" dirty="0" smtClean="0">
+              <a:rPr lang="en-US" sz="1400" dirty="0">
                 <a:solidFill>
                   <a:srgbClr val="0070C0"/>
                 </a:solidFill>
               </a:rPr>
               <a:t>execute(“delete 1”)</a:t>
             </a:r>
-            <a:endParaRPr lang="en-US" sz="1400" dirty="0">
-              <a:solidFill>
-                <a:srgbClr val="0070C0"/>
-              </a:solidFill>
-            </a:endParaRPr>
           </a:p>
         </p:txBody>
       </p:sp>
@@ -4305,7 +4294,7 @@
           <a:lstStyle/>
           <a:p>
             <a:r>
-              <a:rPr lang="en-US" sz="1400" dirty="0" err="1" smtClean="0">
+              <a:rPr lang="en-US" sz="1400" dirty="0" err="1">
                 <a:solidFill>
                   <a:srgbClr val="7030A0"/>
                 </a:solidFill>
@@ -4313,18 +4302,13 @@
               <a:t>deletePerson</a:t>
             </a:r>
             <a:r>
-              <a:rPr lang="en-US" sz="1400" dirty="0" smtClean="0">
+              <a:rPr lang="en-US" sz="1400" dirty="0">
                 <a:solidFill>
                   <a:srgbClr val="7030A0"/>
                 </a:solidFill>
               </a:rPr>
               <a:t>(p)</a:t>
             </a:r>
-            <a:endParaRPr lang="en-US" sz="1400" dirty="0">
-              <a:solidFill>
-                <a:srgbClr val="7030A0"/>
-              </a:solidFill>
-            </a:endParaRPr>
           </a:p>
         </p:txBody>
       </p:sp>
@@ -4351,7 +4335,7 @@
           <a:lstStyle/>
           <a:p>
             <a:r>
-              <a:rPr lang="en-US" sz="1400" dirty="0" smtClean="0">
+              <a:rPr lang="en-US" sz="1400" dirty="0">
                 <a:solidFill>
                   <a:schemeClr val="accent5">
                     <a:lumMod val="75000"/>
@@ -4361,7 +4345,7 @@
               <a:t>post(</a:t>
             </a:r>
             <a:r>
-              <a:rPr lang="en-US" sz="1400" dirty="0" err="1" smtClean="0">
+              <a:rPr lang="en-US" sz="1400" dirty="0" err="1">
                 <a:solidFill>
                   <a:schemeClr val="accent5">
                     <a:lumMod val="75000"/>
@@ -4371,7 +4355,7 @@
               <a:t>AddressBookChangedEvent</a:t>
             </a:r>
             <a:r>
-              <a:rPr lang="en-US" sz="1400" dirty="0" smtClean="0">
+              <a:rPr lang="en-US" sz="1400" dirty="0">
                 <a:solidFill>
                   <a:schemeClr val="accent5">
                     <a:lumMod val="75000"/>
@@ -4380,13 +4364,6 @@
               </a:rPr>
               <a:t>)</a:t>
             </a:r>
-            <a:endParaRPr lang="en-US" sz="1400" dirty="0">
-              <a:solidFill>
-                <a:schemeClr val="accent5">
-                  <a:lumMod val="75000"/>
-                </a:schemeClr>
-              </a:solidFill>
-            </a:endParaRPr>
           </a:p>
         </p:txBody>
       </p:sp>
@@ -4552,7 +4529,7 @@
           <a:p>
             <a:pPr algn="ctr"/>
             <a:r>
-              <a:rPr lang="en-US" sz="1600" dirty="0" smtClean="0">
+              <a:rPr lang="en-US" sz="1600" dirty="0">
                 <a:solidFill>
                   <a:schemeClr val="bg1"/>
                 </a:solidFill>
@@ -4560,7 +4537,7 @@
               <a:t>:</a:t>
             </a:r>
             <a:r>
-              <a:rPr lang="en-US" sz="1600" dirty="0" err="1" smtClean="0">
+              <a:rPr lang="en-US" sz="1600" dirty="0" err="1">
                 <a:solidFill>
                   <a:schemeClr val="bg1"/>
                 </a:solidFill>
@@ -4793,7 +4770,7 @@
           <a:p>
             <a:pPr algn="ctr"/>
             <a:r>
-              <a:rPr lang="en-US" sz="1600" dirty="0" smtClean="0">
+              <a:rPr lang="en-US" sz="1600" dirty="0">
                 <a:solidFill>
                   <a:schemeClr val="bg1"/>
                 </a:solidFill>
@@ -4925,7 +4902,7 @@
           <a:lstStyle/>
           <a:p>
             <a:r>
-              <a:rPr lang="en-US" sz="1400" dirty="0" smtClean="0">
+              <a:rPr lang="en-US" sz="1400" dirty="0">
                 <a:solidFill>
                   <a:schemeClr val="accent5">
                     <a:lumMod val="75000"/>
@@ -4935,7 +4912,7 @@
               <a:t>post(</a:t>
             </a:r>
             <a:r>
-              <a:rPr lang="en-US" sz="1400" dirty="0" err="1" smtClean="0">
+              <a:rPr lang="en-US" sz="1400" dirty="0" err="1">
                 <a:solidFill>
                   <a:schemeClr val="accent5">
                     <a:lumMod val="75000"/>
@@ -4945,7 +4922,7 @@
               <a:t>AddressBookChangedEvent</a:t>
             </a:r>
             <a:r>
-              <a:rPr lang="en-US" sz="1400" dirty="0" smtClean="0">
+              <a:rPr lang="en-US" sz="1400" dirty="0">
                 <a:solidFill>
                   <a:schemeClr val="accent5">
                     <a:lumMod val="75000"/>
@@ -4954,13 +4931,6 @@
               </a:rPr>
               <a:t>)</a:t>
             </a:r>
-            <a:endParaRPr lang="en-US" sz="1400" dirty="0">
-              <a:solidFill>
-                <a:schemeClr val="accent5">
-                  <a:lumMod val="75000"/>
-                </a:schemeClr>
-              </a:solidFill>
-            </a:endParaRPr>
           </a:p>
         </p:txBody>
       </p:sp>
@@ -5052,7 +5022,7 @@
           <a:p>
             <a:pPr algn="ctr"/>
             <a:r>
-              <a:rPr lang="en-US" sz="1600" dirty="0" smtClean="0">
+              <a:rPr lang="en-US" sz="1600" dirty="0">
                 <a:solidFill>
                   <a:schemeClr val="bg1"/>
                 </a:solidFill>
@@ -5060,7 +5030,7 @@
               <a:t>:</a:t>
             </a:r>
             <a:r>
-              <a:rPr lang="en-US" sz="1600" dirty="0" err="1" smtClean="0">
+              <a:rPr lang="en-US" sz="1600" dirty="0" err="1">
                 <a:solidFill>
                   <a:schemeClr val="bg1"/>
                 </a:solidFill>
@@ -5307,7 +5277,7 @@
           <a:lstStyle/>
           <a:p>
             <a:r>
-              <a:rPr lang="en-US" sz="1400" dirty="0" err="1" smtClean="0">
+              <a:rPr lang="en-US" sz="1400" dirty="0" err="1">
                 <a:solidFill>
                   <a:schemeClr val="accent6">
                     <a:lumMod val="75000"/>
@@ -5317,7 +5287,7 @@
               <a:t>handleAddresssBookChangedEvent</a:t>
             </a:r>
             <a:r>
-              <a:rPr lang="en-US" sz="1400" dirty="0" smtClean="0">
+              <a:rPr lang="en-US" sz="1400" dirty="0">
                 <a:solidFill>
                   <a:schemeClr val="accent6">
                     <a:lumMod val="75000"/>
@@ -5326,13 +5296,6 @@
               </a:rPr>
               <a:t>()</a:t>
             </a:r>
-            <a:endParaRPr lang="en-US" sz="1400" dirty="0">
-              <a:solidFill>
-                <a:schemeClr val="accent6">
-                  <a:lumMod val="75000"/>
-                </a:schemeClr>
-              </a:solidFill>
-            </a:endParaRPr>
           </a:p>
         </p:txBody>
       </p:sp>
@@ -5417,7 +5380,7 @@
           <a:p>
             <a:pPr algn="ctr"/>
             <a:r>
-              <a:rPr lang="en-US" sz="1600" dirty="0" smtClean="0">
+              <a:rPr lang="en-US" sz="1600" dirty="0">
                 <a:solidFill>
                   <a:schemeClr val="bg1"/>
                 </a:solidFill>
@@ -5620,7 +5583,7 @@
           <a:lstStyle/>
           <a:p>
             <a:r>
-              <a:rPr lang="en-US" sz="1400" dirty="0" err="1" smtClean="0">
+              <a:rPr lang="en-US" sz="1400" dirty="0" err="1">
                 <a:solidFill>
                   <a:srgbClr val="00B050"/>
                 </a:solidFill>
@@ -5628,18 +5591,13 @@
               <a:t>handleAddresssBookChangedEvent</a:t>
             </a:r>
             <a:r>
-              <a:rPr lang="en-US" sz="1400" dirty="0" smtClean="0">
+              <a:rPr lang="en-US" sz="1400" dirty="0">
                 <a:solidFill>
                   <a:srgbClr val="00B050"/>
                 </a:solidFill>
               </a:rPr>
               <a:t>()</a:t>
             </a:r>
-            <a:endParaRPr lang="en-US" sz="1400" dirty="0">
-              <a:solidFill>
-                <a:srgbClr val="00B050"/>
-              </a:solidFill>
-            </a:endParaRPr>
           </a:p>
         </p:txBody>
       </p:sp>
@@ -5826,18 +5784,13 @@
           <a:p>
             <a:pPr algn="r"/>
             <a:r>
-              <a:rPr lang="en-US" sz="1400" dirty="0" smtClean="0">
+              <a:rPr lang="en-US" sz="1400" dirty="0">
                 <a:solidFill>
                   <a:srgbClr val="00B050"/>
                 </a:solidFill>
               </a:rPr>
               <a:t>Update status bar</a:t>
             </a:r>
-            <a:endParaRPr lang="en-US" sz="1400" dirty="0">
-              <a:solidFill>
-                <a:srgbClr val="00B050"/>
-              </a:solidFill>
-            </a:endParaRPr>
           </a:p>
         </p:txBody>
       </p:sp>
@@ -6027,7 +5980,7 @@
           <a:lstStyle/>
           <a:p>
             <a:r>
-              <a:rPr lang="en-US" sz="1400" dirty="0" smtClean="0">
+              <a:rPr lang="en-US" sz="1400" dirty="0">
                 <a:solidFill>
                   <a:schemeClr val="accent6">
                     <a:lumMod val="75000"/>
@@ -6037,7 +5990,7 @@
               <a:t>Save </a:t>
             </a:r>
             <a:br>
-              <a:rPr lang="en-US" sz="1400" dirty="0" smtClean="0">
+              <a:rPr lang="en-US" sz="1400" dirty="0">
                 <a:solidFill>
                   <a:schemeClr val="accent6">
                     <a:lumMod val="75000"/>
@@ -6046,7 +5999,7 @@
               </a:rPr>
             </a:br>
             <a:r>
-              <a:rPr lang="en-US" sz="1400" dirty="0" smtClean="0">
+              <a:rPr lang="en-US" sz="1400" dirty="0">
                 <a:solidFill>
                   <a:schemeClr val="accent6">
                     <a:lumMod val="75000"/>
@@ -6055,13 +6008,6 @@
               </a:rPr>
               <a:t>to file</a:t>
             </a:r>
-            <a:endParaRPr lang="en-US" sz="1400" dirty="0">
-              <a:solidFill>
-                <a:schemeClr val="accent6">
-                  <a:lumMod val="75000"/>
-                </a:schemeClr>
-              </a:solidFill>
-            </a:endParaRPr>
           </a:p>
         </p:txBody>
       </p:sp>
@@ -6069,6 +6015,2316 @@
     <p:extLst>
       <p:ext uri="{BB962C8B-B14F-4D97-AF65-F5344CB8AC3E}">
         <p14:creationId xmlns:p14="http://schemas.microsoft.com/office/powerpoint/2010/main" val="4023378879"/>
+      </p:ext>
+    </p:extLst>
+  </p:cSld>
+  <p:clrMapOvr>
+    <a:masterClrMapping/>
+  </p:clrMapOvr>
+</p:sld>
+</file>
+
+<file path=ppt/slides/slide2.xml><?xml version="1.0" encoding="utf-8"?>
+<p:sld xmlns:a="http://schemas.openxmlformats.org/drawingml/2006/main" xmlns:r="http://schemas.openxmlformats.org/officeDocument/2006/relationships" xmlns:p="http://schemas.openxmlformats.org/presentationml/2006/main">
+  <p:cSld>
+    <p:spTree>
+      <p:nvGrpSpPr>
+        <p:cNvPr id="1" name=""/>
+        <p:cNvGrpSpPr/>
+        <p:nvPr/>
+      </p:nvGrpSpPr>
+      <p:grpSpPr>
+        <a:xfrm>
+          <a:off x="0" y="0"/>
+          <a:ext cx="0" cy="0"/>
+          <a:chOff x="0" y="0"/>
+          <a:chExt cx="0" cy="0"/>
+        </a:xfrm>
+      </p:grpSpPr>
+      <p:sp>
+        <p:nvSpPr>
+          <p:cNvPr id="10" name="Rectangle 62">
+            <a:extLst>
+              <a:ext uri="{FF2B5EF4-FFF2-40B4-BE49-F238E27FC236}">
+                <a16:creationId xmlns:a16="http://schemas.microsoft.com/office/drawing/2014/main" id="{F8F6A45C-8821-4257-BFB0-C83F4CE5B638}"/>
+              </a:ext>
+            </a:extLst>
+          </p:cNvPr>
+          <p:cNvSpPr/>
+          <p:nvPr/>
+        </p:nvSpPr>
+        <p:spPr>
+          <a:xfrm>
+            <a:off x="838200" y="1600200"/>
+            <a:ext cx="1093635" cy="346760"/>
+          </a:xfrm>
+          <a:prstGeom prst="rect">
+            <a:avLst/>
+          </a:prstGeom>
+          <a:solidFill>
+            <a:srgbClr val="0070C0"/>
+          </a:solidFill>
+          <a:ln w="19050">
+            <a:solidFill>
+              <a:srgbClr val="0070C0"/>
+            </a:solidFill>
+          </a:ln>
+          <a:effectLst/>
+        </p:spPr>
+        <p:style>
+          <a:lnRef idx="1">
+            <a:schemeClr val="accent2"/>
+          </a:lnRef>
+          <a:fillRef idx="2">
+            <a:schemeClr val="accent2"/>
+          </a:fillRef>
+          <a:effectRef idx="1">
+            <a:schemeClr val="accent2"/>
+          </a:effectRef>
+          <a:fontRef idx="minor">
+            <a:schemeClr val="dk1"/>
+          </a:fontRef>
+        </p:style>
+        <p:txBody>
+          <a:bodyPr rtlCol="0" anchor="ctr"/>
+          <a:lstStyle/>
+          <a:p>
+            <a:pPr algn="ctr"/>
+            <a:r>
+              <a:rPr lang="en-US" sz="1600" dirty="0">
+                <a:solidFill>
+                  <a:schemeClr val="bg1"/>
+                </a:solidFill>
+              </a:rPr>
+              <a:t>:Logic</a:t>
+            </a:r>
+            <a:endParaRPr lang="en-SG" sz="1600" dirty="0">
+              <a:solidFill>
+                <a:schemeClr val="bg1"/>
+              </a:solidFill>
+            </a:endParaRPr>
+          </a:p>
+        </p:txBody>
+      </p:sp>
+      <p:cxnSp>
+        <p:nvCxnSpPr>
+          <p:cNvPr id="11" name="Straight Connector 10">
+            <a:extLst>
+              <a:ext uri="{FF2B5EF4-FFF2-40B4-BE49-F238E27FC236}">
+                <a16:creationId xmlns:a16="http://schemas.microsoft.com/office/drawing/2014/main" id="{9184585E-5FA0-454D-9DA7-A7AD70BBD2AD}"/>
+              </a:ext>
+            </a:extLst>
+          </p:cNvPr>
+          <p:cNvCxnSpPr>
+            <a:cxnSpLocks/>
+          </p:cNvCxnSpPr>
+          <p:nvPr/>
+        </p:nvCxnSpPr>
+        <p:spPr>
+          <a:xfrm>
+            <a:off x="1385017" y="1963871"/>
+            <a:ext cx="0" cy="4436929"/>
+          </a:xfrm>
+          <a:prstGeom prst="line">
+            <a:avLst/>
+          </a:prstGeom>
+          <a:ln w="19050">
+            <a:solidFill>
+              <a:srgbClr val="0070C0"/>
+            </a:solidFill>
+            <a:prstDash val="sysDash"/>
+          </a:ln>
+          <a:effectLst/>
+        </p:spPr>
+        <p:style>
+          <a:lnRef idx="1">
+            <a:schemeClr val="accent1"/>
+          </a:lnRef>
+          <a:fillRef idx="2">
+            <a:schemeClr val="accent1"/>
+          </a:fillRef>
+          <a:effectRef idx="1">
+            <a:schemeClr val="accent1"/>
+          </a:effectRef>
+          <a:fontRef idx="minor">
+            <a:schemeClr val="dk1"/>
+          </a:fontRef>
+        </p:style>
+      </p:cxnSp>
+      <p:sp>
+        <p:nvSpPr>
+          <p:cNvPr id="12" name="Rectangle 11">
+            <a:extLst>
+              <a:ext uri="{FF2B5EF4-FFF2-40B4-BE49-F238E27FC236}">
+                <a16:creationId xmlns:a16="http://schemas.microsoft.com/office/drawing/2014/main" id="{5540F8F5-F747-4377-865D-3D3AB27C9A60}"/>
+              </a:ext>
+            </a:extLst>
+          </p:cNvPr>
+          <p:cNvSpPr/>
+          <p:nvPr/>
+        </p:nvSpPr>
+        <p:spPr>
+          <a:xfrm>
+            <a:off x="1294303" y="2422063"/>
+            <a:ext cx="170714" cy="3673929"/>
+          </a:xfrm>
+          <a:prstGeom prst="rect">
+            <a:avLst/>
+          </a:prstGeom>
+          <a:solidFill>
+            <a:srgbClr val="0070C0"/>
+          </a:solidFill>
+          <a:ln>
+            <a:solidFill>
+              <a:srgbClr val="0070C0"/>
+            </a:solidFill>
+          </a:ln>
+          <a:effectLst/>
+        </p:spPr>
+        <p:style>
+          <a:lnRef idx="1">
+            <a:schemeClr val="accent3"/>
+          </a:lnRef>
+          <a:fillRef idx="2">
+            <a:schemeClr val="accent3"/>
+          </a:fillRef>
+          <a:effectRef idx="1">
+            <a:schemeClr val="accent3"/>
+          </a:effectRef>
+          <a:fontRef idx="minor">
+            <a:schemeClr val="dk1"/>
+          </a:fontRef>
+        </p:style>
+        <p:txBody>
+          <a:bodyPr rtlCol="0" anchor="ctr"/>
+          <a:lstStyle/>
+          <a:p>
+            <a:pPr algn="ctr"/>
+            <a:endParaRPr lang="en-SG" sz="1400">
+              <a:solidFill>
+                <a:schemeClr val="dk1"/>
+              </a:solidFill>
+            </a:endParaRPr>
+          </a:p>
+        </p:txBody>
+      </p:sp>
+      <p:sp>
+        <p:nvSpPr>
+          <p:cNvPr id="13" name="Rectangle 62">
+            <a:extLst>
+              <a:ext uri="{FF2B5EF4-FFF2-40B4-BE49-F238E27FC236}">
+                <a16:creationId xmlns:a16="http://schemas.microsoft.com/office/drawing/2014/main" id="{7602A179-6A4B-4911-AADB-006DAA508C6E}"/>
+              </a:ext>
+            </a:extLst>
+          </p:cNvPr>
+          <p:cNvSpPr/>
+          <p:nvPr/>
+        </p:nvSpPr>
+        <p:spPr>
+          <a:xfrm>
+            <a:off x="3046227" y="1617111"/>
+            <a:ext cx="1093635" cy="346760"/>
+          </a:xfrm>
+          <a:prstGeom prst="rect">
+            <a:avLst/>
+          </a:prstGeom>
+          <a:solidFill>
+            <a:srgbClr val="7030A0"/>
+          </a:solidFill>
+          <a:ln w="19050">
+            <a:solidFill>
+              <a:srgbClr val="7030A0"/>
+            </a:solidFill>
+          </a:ln>
+          <a:effectLst/>
+        </p:spPr>
+        <p:style>
+          <a:lnRef idx="1">
+            <a:schemeClr val="accent2"/>
+          </a:lnRef>
+          <a:fillRef idx="2">
+            <a:schemeClr val="accent2"/>
+          </a:fillRef>
+          <a:effectRef idx="1">
+            <a:schemeClr val="accent2"/>
+          </a:effectRef>
+          <a:fontRef idx="minor">
+            <a:schemeClr val="dk1"/>
+          </a:fontRef>
+        </p:style>
+        <p:txBody>
+          <a:bodyPr rtlCol="0" anchor="ctr"/>
+          <a:lstStyle/>
+          <a:p>
+            <a:pPr algn="ctr"/>
+            <a:r>
+              <a:rPr lang="en-US" sz="1600" dirty="0">
+                <a:solidFill>
+                  <a:schemeClr val="bg1"/>
+                </a:solidFill>
+              </a:rPr>
+              <a:t>:Model</a:t>
+            </a:r>
+            <a:endParaRPr lang="en-SG" sz="1600" dirty="0">
+              <a:solidFill>
+                <a:schemeClr val="bg1"/>
+              </a:solidFill>
+            </a:endParaRPr>
+          </a:p>
+        </p:txBody>
+      </p:sp>
+      <p:cxnSp>
+        <p:nvCxnSpPr>
+          <p:cNvPr id="14" name="Straight Connector 13">
+            <a:extLst>
+              <a:ext uri="{FF2B5EF4-FFF2-40B4-BE49-F238E27FC236}">
+                <a16:creationId xmlns:a16="http://schemas.microsoft.com/office/drawing/2014/main" id="{4F9D05A6-26EB-42E5-A585-2E9D1DF0555F}"/>
+              </a:ext>
+            </a:extLst>
+          </p:cNvPr>
+          <p:cNvCxnSpPr>
+            <a:cxnSpLocks/>
+          </p:cNvCxnSpPr>
+          <p:nvPr/>
+        </p:nvCxnSpPr>
+        <p:spPr>
+          <a:xfrm flipH="1">
+            <a:off x="3593044" y="1931333"/>
+            <a:ext cx="15695" cy="4317067"/>
+          </a:xfrm>
+          <a:prstGeom prst="line">
+            <a:avLst/>
+          </a:prstGeom>
+          <a:ln w="19050">
+            <a:solidFill>
+              <a:srgbClr val="7030A0"/>
+            </a:solidFill>
+            <a:prstDash val="sysDash"/>
+          </a:ln>
+          <a:effectLst/>
+        </p:spPr>
+        <p:style>
+          <a:lnRef idx="1">
+            <a:schemeClr val="accent1"/>
+          </a:lnRef>
+          <a:fillRef idx="2">
+            <a:schemeClr val="accent1"/>
+          </a:fillRef>
+          <a:effectRef idx="1">
+            <a:schemeClr val="accent1"/>
+          </a:effectRef>
+          <a:fontRef idx="minor">
+            <a:schemeClr val="dk1"/>
+          </a:fontRef>
+        </p:style>
+      </p:cxnSp>
+      <p:sp>
+        <p:nvSpPr>
+          <p:cNvPr id="15" name="Rectangle 14">
+            <a:extLst>
+              <a:ext uri="{FF2B5EF4-FFF2-40B4-BE49-F238E27FC236}">
+                <a16:creationId xmlns:a16="http://schemas.microsoft.com/office/drawing/2014/main" id="{0CE567C2-1F9D-4961-A250-E0646F9FC4B3}"/>
+              </a:ext>
+            </a:extLst>
+          </p:cNvPr>
+          <p:cNvSpPr/>
+          <p:nvPr/>
+        </p:nvSpPr>
+        <p:spPr>
+          <a:xfrm>
+            <a:off x="3534721" y="2498144"/>
+            <a:ext cx="122673" cy="332350"/>
+          </a:xfrm>
+          <a:prstGeom prst="rect">
+            <a:avLst/>
+          </a:prstGeom>
+          <a:solidFill>
+            <a:srgbClr val="7030A0"/>
+          </a:solidFill>
+          <a:ln>
+            <a:solidFill>
+              <a:srgbClr val="7030A0"/>
+            </a:solidFill>
+          </a:ln>
+          <a:effectLst/>
+        </p:spPr>
+        <p:style>
+          <a:lnRef idx="1">
+            <a:schemeClr val="accent3"/>
+          </a:lnRef>
+          <a:fillRef idx="2">
+            <a:schemeClr val="accent3"/>
+          </a:fillRef>
+          <a:effectRef idx="1">
+            <a:schemeClr val="accent3"/>
+          </a:effectRef>
+          <a:fontRef idx="minor">
+            <a:schemeClr val="dk1"/>
+          </a:fontRef>
+        </p:style>
+        <p:txBody>
+          <a:bodyPr rtlCol="0" anchor="ctr"/>
+          <a:lstStyle/>
+          <a:p>
+            <a:pPr algn="ctr"/>
+            <a:endParaRPr lang="en-SG" sz="1400">
+              <a:solidFill>
+                <a:schemeClr val="dk1"/>
+              </a:solidFill>
+            </a:endParaRPr>
+          </a:p>
+        </p:txBody>
+      </p:sp>
+      <p:cxnSp>
+        <p:nvCxnSpPr>
+          <p:cNvPr id="18" name="Straight Arrow Connector 17">
+            <a:extLst>
+              <a:ext uri="{FF2B5EF4-FFF2-40B4-BE49-F238E27FC236}">
+                <a16:creationId xmlns:a16="http://schemas.microsoft.com/office/drawing/2014/main" id="{F9B384BC-F658-49E5-A80B-20568F5CC497}"/>
+              </a:ext>
+            </a:extLst>
+          </p:cNvPr>
+          <p:cNvCxnSpPr>
+            <a:cxnSpLocks/>
+          </p:cNvCxnSpPr>
+          <p:nvPr/>
+        </p:nvCxnSpPr>
+        <p:spPr>
+          <a:xfrm>
+            <a:off x="76200" y="2422065"/>
+            <a:ext cx="1236809" cy="0"/>
+          </a:xfrm>
+          <a:prstGeom prst="straightConnector1">
+            <a:avLst/>
+          </a:prstGeom>
+          <a:ln w="19050">
+            <a:solidFill>
+              <a:srgbClr val="00B050"/>
+            </a:solidFill>
+            <a:tailEnd type="arrow"/>
+          </a:ln>
+        </p:spPr>
+        <p:style>
+          <a:lnRef idx="1">
+            <a:schemeClr val="accent1"/>
+          </a:lnRef>
+          <a:fillRef idx="0">
+            <a:schemeClr val="accent1"/>
+          </a:fillRef>
+          <a:effectRef idx="0">
+            <a:schemeClr val="accent1"/>
+          </a:effectRef>
+          <a:fontRef idx="minor">
+            <a:schemeClr val="tx1"/>
+          </a:fontRef>
+        </p:style>
+      </p:cxnSp>
+      <p:sp>
+        <p:nvSpPr>
+          <p:cNvPr id="19" name="TextBox 18">
+            <a:extLst>
+              <a:ext uri="{FF2B5EF4-FFF2-40B4-BE49-F238E27FC236}">
+                <a16:creationId xmlns:a16="http://schemas.microsoft.com/office/drawing/2014/main" id="{5521AD43-5D16-4CED-95DB-7D268FD2E4BF}"/>
+              </a:ext>
+            </a:extLst>
+          </p:cNvPr>
+          <p:cNvSpPr txBox="1"/>
+          <p:nvPr/>
+        </p:nvSpPr>
+        <p:spPr>
+          <a:xfrm>
+            <a:off x="52176" y="2410452"/>
+            <a:ext cx="1539848" cy="430887"/>
+          </a:xfrm>
+          <a:prstGeom prst="rect">
+            <a:avLst/>
+          </a:prstGeom>
+          <a:noFill/>
+        </p:spPr>
+        <p:txBody>
+          <a:bodyPr wrap="square" lIns="0" tIns="0" rIns="0" bIns="0" rtlCol="0">
+            <a:spAutoFit/>
+          </a:bodyPr>
+          <a:lstStyle/>
+          <a:p>
+            <a:r>
+              <a:rPr lang="en-US" sz="1400" dirty="0">
+                <a:solidFill>
+                  <a:srgbClr val="0070C0"/>
+                </a:solidFill>
+              </a:rPr>
+              <a:t>Execute</a:t>
+            </a:r>
+          </a:p>
+          <a:p>
+            <a:r>
+              <a:rPr lang="en-US" sz="1400" dirty="0">
+                <a:solidFill>
+                  <a:srgbClr val="0070C0"/>
+                </a:solidFill>
+              </a:rPr>
+              <a:t>(“login u p”)</a:t>
+            </a:r>
+          </a:p>
+        </p:txBody>
+      </p:sp>
+      <p:cxnSp>
+        <p:nvCxnSpPr>
+          <p:cNvPr id="20" name="Straight Arrow Connector 19">
+            <a:extLst>
+              <a:ext uri="{FF2B5EF4-FFF2-40B4-BE49-F238E27FC236}">
+                <a16:creationId xmlns:a16="http://schemas.microsoft.com/office/drawing/2014/main" id="{788C17B5-3E03-4721-90D4-F90254CFF747}"/>
+              </a:ext>
+            </a:extLst>
+          </p:cNvPr>
+          <p:cNvCxnSpPr>
+            <a:cxnSpLocks/>
+          </p:cNvCxnSpPr>
+          <p:nvPr/>
+        </p:nvCxnSpPr>
+        <p:spPr>
+          <a:xfrm>
+            <a:off x="1457025" y="2526996"/>
+            <a:ext cx="2022953" cy="0"/>
+          </a:xfrm>
+          <a:prstGeom prst="straightConnector1">
+            <a:avLst/>
+          </a:prstGeom>
+          <a:ln w="19050">
+            <a:solidFill>
+              <a:srgbClr val="0070C0"/>
+            </a:solidFill>
+            <a:tailEnd type="arrow"/>
+          </a:ln>
+        </p:spPr>
+        <p:style>
+          <a:lnRef idx="1">
+            <a:schemeClr val="accent1"/>
+          </a:lnRef>
+          <a:fillRef idx="0">
+            <a:schemeClr val="accent1"/>
+          </a:fillRef>
+          <a:effectRef idx="0">
+            <a:schemeClr val="accent1"/>
+          </a:effectRef>
+          <a:fontRef idx="minor">
+            <a:schemeClr val="tx1"/>
+          </a:fontRef>
+        </p:style>
+      </p:cxnSp>
+      <p:sp>
+        <p:nvSpPr>
+          <p:cNvPr id="21" name="TextBox 20">
+            <a:extLst>
+              <a:ext uri="{FF2B5EF4-FFF2-40B4-BE49-F238E27FC236}">
+                <a16:creationId xmlns:a16="http://schemas.microsoft.com/office/drawing/2014/main" id="{F3FC2E6B-B5CC-40B3-8F4B-87BC1E38CAB8}"/>
+              </a:ext>
+            </a:extLst>
+          </p:cNvPr>
+          <p:cNvSpPr txBox="1"/>
+          <p:nvPr/>
+        </p:nvSpPr>
+        <p:spPr>
+          <a:xfrm>
+            <a:off x="2055132" y="4149238"/>
+            <a:ext cx="1424846" cy="215444"/>
+          </a:xfrm>
+          <a:prstGeom prst="rect">
+            <a:avLst/>
+          </a:prstGeom>
+          <a:noFill/>
+        </p:spPr>
+        <p:txBody>
+          <a:bodyPr wrap="square" lIns="0" tIns="0" rIns="0" bIns="0" rtlCol="0">
+            <a:spAutoFit/>
+          </a:bodyPr>
+          <a:lstStyle/>
+          <a:p>
+            <a:r>
+              <a:rPr lang="en-US" sz="1400" dirty="0" err="1">
+                <a:solidFill>
+                  <a:srgbClr val="7030A0"/>
+                </a:solidFill>
+              </a:rPr>
+              <a:t>setLogin</a:t>
+            </a:r>
+            <a:r>
+              <a:rPr lang="en-US" sz="1400" dirty="0">
+                <a:solidFill>
+                  <a:srgbClr val="7030A0"/>
+                </a:solidFill>
+              </a:rPr>
+              <a:t>(admin)</a:t>
+            </a:r>
+          </a:p>
+        </p:txBody>
+      </p:sp>
+      <p:sp>
+        <p:nvSpPr>
+          <p:cNvPr id="22" name="TextBox 21">
+            <a:extLst>
+              <a:ext uri="{FF2B5EF4-FFF2-40B4-BE49-F238E27FC236}">
+                <a16:creationId xmlns:a16="http://schemas.microsoft.com/office/drawing/2014/main" id="{0FACAD6C-B291-4C9F-A266-F2D254035C7A}"/>
+              </a:ext>
+            </a:extLst>
+          </p:cNvPr>
+          <p:cNvSpPr txBox="1"/>
+          <p:nvPr/>
+        </p:nvSpPr>
+        <p:spPr>
+          <a:xfrm>
+            <a:off x="4517566" y="5118556"/>
+            <a:ext cx="2438400" cy="215444"/>
+          </a:xfrm>
+          <a:prstGeom prst="rect">
+            <a:avLst/>
+          </a:prstGeom>
+          <a:noFill/>
+        </p:spPr>
+        <p:txBody>
+          <a:bodyPr wrap="square" lIns="0" tIns="0" rIns="0" bIns="0" rtlCol="0">
+            <a:spAutoFit/>
+          </a:bodyPr>
+          <a:lstStyle/>
+          <a:p>
+            <a:r>
+              <a:rPr lang="en-US" sz="1400" dirty="0">
+                <a:solidFill>
+                  <a:schemeClr val="accent5">
+                    <a:lumMod val="75000"/>
+                  </a:schemeClr>
+                </a:solidFill>
+              </a:rPr>
+              <a:t>post(</a:t>
+            </a:r>
+            <a:r>
+              <a:rPr lang="en-US" sz="1400" dirty="0" err="1">
+                <a:solidFill>
+                  <a:schemeClr val="accent5">
+                    <a:lumMod val="75000"/>
+                  </a:schemeClr>
+                </a:solidFill>
+              </a:rPr>
+              <a:t>AdminLoginEvent</a:t>
+            </a:r>
+            <a:r>
+              <a:rPr lang="en-US" sz="1400" dirty="0">
+                <a:solidFill>
+                  <a:schemeClr val="accent5">
+                    <a:lumMod val="75000"/>
+                  </a:schemeClr>
+                </a:solidFill>
+              </a:rPr>
+              <a:t>)</a:t>
+            </a:r>
+          </a:p>
+        </p:txBody>
+      </p:sp>
+      <p:cxnSp>
+        <p:nvCxnSpPr>
+          <p:cNvPr id="23" name="Straight Arrow Connector 22">
+            <a:extLst>
+              <a:ext uri="{FF2B5EF4-FFF2-40B4-BE49-F238E27FC236}">
+                <a16:creationId xmlns:a16="http://schemas.microsoft.com/office/drawing/2014/main" id="{39EA0AE4-F7A9-4955-A85C-967649DAECBD}"/>
+              </a:ext>
+            </a:extLst>
+          </p:cNvPr>
+          <p:cNvCxnSpPr>
+            <a:cxnSpLocks/>
+          </p:cNvCxnSpPr>
+          <p:nvPr/>
+        </p:nvCxnSpPr>
+        <p:spPr>
+          <a:xfrm>
+            <a:off x="1457025" y="2817387"/>
+            <a:ext cx="2077696" cy="0"/>
+          </a:xfrm>
+          <a:prstGeom prst="straightConnector1">
+            <a:avLst/>
+          </a:prstGeom>
+          <a:ln w="19050">
+            <a:solidFill>
+              <a:srgbClr val="7030A0"/>
+            </a:solidFill>
+            <a:prstDash val="sysDash"/>
+            <a:headEnd type="arrow" w="med" len="med"/>
+            <a:tailEnd type="none" w="med" len="med"/>
+          </a:ln>
+        </p:spPr>
+        <p:style>
+          <a:lnRef idx="1">
+            <a:schemeClr val="accent1"/>
+          </a:lnRef>
+          <a:fillRef idx="0">
+            <a:schemeClr val="accent1"/>
+          </a:fillRef>
+          <a:effectRef idx="0">
+            <a:schemeClr val="accent1"/>
+          </a:effectRef>
+          <a:fontRef idx="minor">
+            <a:schemeClr val="tx1"/>
+          </a:fontRef>
+        </p:style>
+      </p:cxnSp>
+      <p:sp>
+        <p:nvSpPr>
+          <p:cNvPr id="26" name="Rectangle 62">
+            <a:extLst>
+              <a:ext uri="{FF2B5EF4-FFF2-40B4-BE49-F238E27FC236}">
+                <a16:creationId xmlns:a16="http://schemas.microsoft.com/office/drawing/2014/main" id="{DC0265F8-D474-47BB-8A2E-FB1AB5BF2F26}"/>
+              </a:ext>
+            </a:extLst>
+          </p:cNvPr>
+          <p:cNvSpPr/>
+          <p:nvPr/>
+        </p:nvSpPr>
+        <p:spPr>
+          <a:xfrm>
+            <a:off x="7258500" y="1584573"/>
+            <a:ext cx="1371600" cy="346760"/>
+          </a:xfrm>
+          <a:prstGeom prst="rect">
+            <a:avLst/>
+          </a:prstGeom>
+          <a:solidFill>
+            <a:schemeClr val="accent5">
+              <a:lumMod val="75000"/>
+            </a:schemeClr>
+          </a:solidFill>
+          <a:ln w="19050">
+            <a:solidFill>
+              <a:schemeClr val="accent5">
+                <a:lumMod val="75000"/>
+              </a:schemeClr>
+            </a:solidFill>
+          </a:ln>
+          <a:effectLst/>
+        </p:spPr>
+        <p:style>
+          <a:lnRef idx="1">
+            <a:schemeClr val="accent2"/>
+          </a:lnRef>
+          <a:fillRef idx="2">
+            <a:schemeClr val="accent2"/>
+          </a:fillRef>
+          <a:effectRef idx="1">
+            <a:schemeClr val="accent2"/>
+          </a:effectRef>
+          <a:fontRef idx="minor">
+            <a:schemeClr val="dk1"/>
+          </a:fontRef>
+        </p:style>
+        <p:txBody>
+          <a:bodyPr rtlCol="0" anchor="ctr"/>
+          <a:lstStyle/>
+          <a:p>
+            <a:pPr algn="ctr"/>
+            <a:r>
+              <a:rPr lang="en-US" sz="1600" dirty="0">
+                <a:solidFill>
+                  <a:schemeClr val="bg1"/>
+                </a:solidFill>
+              </a:rPr>
+              <a:t>:</a:t>
+            </a:r>
+            <a:r>
+              <a:rPr lang="en-US" sz="1600" dirty="0" err="1">
+                <a:solidFill>
+                  <a:schemeClr val="bg1"/>
+                </a:solidFill>
+              </a:rPr>
+              <a:t>EventsCenter</a:t>
+            </a:r>
+            <a:endParaRPr lang="en-SG" sz="1600" dirty="0">
+              <a:solidFill>
+                <a:schemeClr val="bg1"/>
+              </a:solidFill>
+            </a:endParaRPr>
+          </a:p>
+        </p:txBody>
+      </p:sp>
+      <p:cxnSp>
+        <p:nvCxnSpPr>
+          <p:cNvPr id="27" name="Straight Connector 26">
+            <a:extLst>
+              <a:ext uri="{FF2B5EF4-FFF2-40B4-BE49-F238E27FC236}">
+                <a16:creationId xmlns:a16="http://schemas.microsoft.com/office/drawing/2014/main" id="{F227F39D-A66E-41A6-A9FA-04690B9FD46A}"/>
+              </a:ext>
+            </a:extLst>
+          </p:cNvPr>
+          <p:cNvCxnSpPr>
+            <a:cxnSpLocks/>
+          </p:cNvCxnSpPr>
+          <p:nvPr/>
+        </p:nvCxnSpPr>
+        <p:spPr>
+          <a:xfrm flipH="1">
+            <a:off x="7917344" y="1946960"/>
+            <a:ext cx="26956" cy="4301440"/>
+          </a:xfrm>
+          <a:prstGeom prst="line">
+            <a:avLst/>
+          </a:prstGeom>
+          <a:ln w="19050">
+            <a:solidFill>
+              <a:schemeClr val="accent5">
+                <a:lumMod val="75000"/>
+              </a:schemeClr>
+            </a:solidFill>
+            <a:prstDash val="sysDash"/>
+          </a:ln>
+          <a:effectLst/>
+        </p:spPr>
+        <p:style>
+          <a:lnRef idx="1">
+            <a:schemeClr val="accent1"/>
+          </a:lnRef>
+          <a:fillRef idx="2">
+            <a:schemeClr val="accent1"/>
+          </a:fillRef>
+          <a:effectRef idx="1">
+            <a:schemeClr val="accent1"/>
+          </a:effectRef>
+          <a:fontRef idx="minor">
+            <a:schemeClr val="dk1"/>
+          </a:fontRef>
+        </p:style>
+      </p:cxnSp>
+      <p:sp>
+        <p:nvSpPr>
+          <p:cNvPr id="28" name="Rectangle 27">
+            <a:extLst>
+              <a:ext uri="{FF2B5EF4-FFF2-40B4-BE49-F238E27FC236}">
+                <a16:creationId xmlns:a16="http://schemas.microsoft.com/office/drawing/2014/main" id="{442966E9-3DED-4600-9C61-DCDFEFAB1C2B}"/>
+              </a:ext>
+            </a:extLst>
+          </p:cNvPr>
+          <p:cNvSpPr/>
+          <p:nvPr/>
+        </p:nvSpPr>
+        <p:spPr>
+          <a:xfrm>
+            <a:off x="7871079" y="5349391"/>
+            <a:ext cx="156461" cy="594209"/>
+          </a:xfrm>
+          <a:prstGeom prst="rect">
+            <a:avLst/>
+          </a:prstGeom>
+          <a:solidFill>
+            <a:schemeClr val="accent5">
+              <a:lumMod val="75000"/>
+            </a:schemeClr>
+          </a:solidFill>
+          <a:ln>
+            <a:solidFill>
+              <a:schemeClr val="accent5">
+                <a:lumMod val="75000"/>
+              </a:schemeClr>
+            </a:solidFill>
+          </a:ln>
+          <a:effectLst/>
+        </p:spPr>
+        <p:style>
+          <a:lnRef idx="1">
+            <a:schemeClr val="accent3"/>
+          </a:lnRef>
+          <a:fillRef idx="2">
+            <a:schemeClr val="accent3"/>
+          </a:fillRef>
+          <a:effectRef idx="1">
+            <a:schemeClr val="accent3"/>
+          </a:effectRef>
+          <a:fontRef idx="minor">
+            <a:schemeClr val="dk1"/>
+          </a:fontRef>
+        </p:style>
+        <p:txBody>
+          <a:bodyPr rtlCol="0" anchor="ctr"/>
+          <a:lstStyle/>
+          <a:p>
+            <a:pPr algn="ctr"/>
+            <a:endParaRPr lang="en-SG" sz="1400">
+              <a:solidFill>
+                <a:schemeClr val="dk1"/>
+              </a:solidFill>
+            </a:endParaRPr>
+          </a:p>
+        </p:txBody>
+      </p:sp>
+      <p:cxnSp>
+        <p:nvCxnSpPr>
+          <p:cNvPr id="29" name="Straight Arrow Connector 28">
+            <a:extLst>
+              <a:ext uri="{FF2B5EF4-FFF2-40B4-BE49-F238E27FC236}">
+                <a16:creationId xmlns:a16="http://schemas.microsoft.com/office/drawing/2014/main" id="{D1AC4692-59C5-483E-B637-B1EC4F6486AC}"/>
+              </a:ext>
+            </a:extLst>
+          </p:cNvPr>
+          <p:cNvCxnSpPr>
+            <a:cxnSpLocks/>
+          </p:cNvCxnSpPr>
+          <p:nvPr/>
+        </p:nvCxnSpPr>
+        <p:spPr>
+          <a:xfrm flipV="1">
+            <a:off x="3681319" y="5349391"/>
+            <a:ext cx="4273641" cy="7550"/>
+          </a:xfrm>
+          <a:prstGeom prst="straightConnector1">
+            <a:avLst/>
+          </a:prstGeom>
+          <a:ln w="19050">
+            <a:solidFill>
+              <a:srgbClr val="7030A0"/>
+            </a:solidFill>
+            <a:tailEnd type="arrow"/>
+          </a:ln>
+        </p:spPr>
+        <p:style>
+          <a:lnRef idx="1">
+            <a:schemeClr val="accent1"/>
+          </a:lnRef>
+          <a:fillRef idx="0">
+            <a:schemeClr val="accent1"/>
+          </a:fillRef>
+          <a:effectRef idx="0">
+            <a:schemeClr val="accent1"/>
+          </a:effectRef>
+          <a:fontRef idx="minor">
+            <a:schemeClr val="tx1"/>
+          </a:fontRef>
+        </p:style>
+      </p:cxnSp>
+      <p:cxnSp>
+        <p:nvCxnSpPr>
+          <p:cNvPr id="30" name="Straight Arrow Connector 29">
+            <a:extLst>
+              <a:ext uri="{FF2B5EF4-FFF2-40B4-BE49-F238E27FC236}">
+                <a16:creationId xmlns:a16="http://schemas.microsoft.com/office/drawing/2014/main" id="{67BC8017-1E0B-46F1-BE1F-71344B742186}"/>
+              </a:ext>
+            </a:extLst>
+          </p:cNvPr>
+          <p:cNvCxnSpPr>
+            <a:cxnSpLocks/>
+          </p:cNvCxnSpPr>
+          <p:nvPr/>
+        </p:nvCxnSpPr>
+        <p:spPr>
+          <a:xfrm>
+            <a:off x="3681319" y="5943600"/>
+            <a:ext cx="4292133" cy="0"/>
+          </a:xfrm>
+          <a:prstGeom prst="straightConnector1">
+            <a:avLst/>
+          </a:prstGeom>
+          <a:ln w="19050">
+            <a:solidFill>
+              <a:schemeClr val="accent5">
+                <a:lumMod val="75000"/>
+              </a:schemeClr>
+            </a:solidFill>
+            <a:prstDash val="sysDash"/>
+            <a:headEnd type="arrow" w="med" len="med"/>
+            <a:tailEnd type="none" w="med" len="med"/>
+          </a:ln>
+        </p:spPr>
+        <p:style>
+          <a:lnRef idx="1">
+            <a:schemeClr val="accent1"/>
+          </a:lnRef>
+          <a:fillRef idx="0">
+            <a:schemeClr val="accent1"/>
+          </a:fillRef>
+          <a:effectRef idx="0">
+            <a:schemeClr val="accent1"/>
+          </a:effectRef>
+          <a:fontRef idx="minor">
+            <a:schemeClr val="tx1"/>
+          </a:fontRef>
+        </p:style>
+      </p:cxnSp>
+      <p:sp>
+        <p:nvSpPr>
+          <p:cNvPr id="58" name="Rectangle 57">
+            <a:extLst>
+              <a:ext uri="{FF2B5EF4-FFF2-40B4-BE49-F238E27FC236}">
+                <a16:creationId xmlns:a16="http://schemas.microsoft.com/office/drawing/2014/main" id="{AC3E0798-5007-46CD-86A7-F5B09BE12FE4}"/>
+              </a:ext>
+            </a:extLst>
+          </p:cNvPr>
+          <p:cNvSpPr/>
+          <p:nvPr/>
+        </p:nvSpPr>
+        <p:spPr>
+          <a:xfrm>
+            <a:off x="3479978" y="4137199"/>
+            <a:ext cx="201341" cy="1882602"/>
+          </a:xfrm>
+          <a:prstGeom prst="rect">
+            <a:avLst/>
+          </a:prstGeom>
+          <a:solidFill>
+            <a:srgbClr val="7030A0"/>
+          </a:solidFill>
+          <a:ln>
+            <a:solidFill>
+              <a:srgbClr val="7030A0"/>
+            </a:solidFill>
+          </a:ln>
+          <a:effectLst/>
+        </p:spPr>
+        <p:style>
+          <a:lnRef idx="1">
+            <a:schemeClr val="accent3"/>
+          </a:lnRef>
+          <a:fillRef idx="2">
+            <a:schemeClr val="accent3"/>
+          </a:fillRef>
+          <a:effectRef idx="1">
+            <a:schemeClr val="accent3"/>
+          </a:effectRef>
+          <a:fontRef idx="minor">
+            <a:schemeClr val="dk1"/>
+          </a:fontRef>
+        </p:style>
+        <p:txBody>
+          <a:bodyPr rtlCol="0" anchor="ctr"/>
+          <a:lstStyle/>
+          <a:p>
+            <a:pPr algn="ctr"/>
+            <a:endParaRPr lang="en-SG" sz="1400">
+              <a:solidFill>
+                <a:schemeClr val="dk1"/>
+              </a:solidFill>
+            </a:endParaRPr>
+          </a:p>
+        </p:txBody>
+      </p:sp>
+      <p:sp>
+        <p:nvSpPr>
+          <p:cNvPr id="62" name="Rectangle 62">
+            <a:extLst>
+              <a:ext uri="{FF2B5EF4-FFF2-40B4-BE49-F238E27FC236}">
+                <a16:creationId xmlns:a16="http://schemas.microsoft.com/office/drawing/2014/main" id="{9DDAE41F-8934-47D5-8F3D-63B04C1F48C3}"/>
+              </a:ext>
+            </a:extLst>
+          </p:cNvPr>
+          <p:cNvSpPr/>
+          <p:nvPr/>
+        </p:nvSpPr>
+        <p:spPr>
+          <a:xfrm>
+            <a:off x="2385393" y="2980372"/>
+            <a:ext cx="1093635" cy="346760"/>
+          </a:xfrm>
+          <a:prstGeom prst="rect">
+            <a:avLst/>
+          </a:prstGeom>
+          <a:solidFill>
+            <a:schemeClr val="accent2"/>
+          </a:solidFill>
+          <a:ln w="19050">
+            <a:solidFill>
+              <a:srgbClr val="7030A0"/>
+            </a:solidFill>
+          </a:ln>
+          <a:effectLst/>
+        </p:spPr>
+        <p:style>
+          <a:lnRef idx="1">
+            <a:schemeClr val="accent2"/>
+          </a:lnRef>
+          <a:fillRef idx="2">
+            <a:schemeClr val="accent2"/>
+          </a:fillRef>
+          <a:effectRef idx="1">
+            <a:schemeClr val="accent2"/>
+          </a:effectRef>
+          <a:fontRef idx="minor">
+            <a:schemeClr val="dk1"/>
+          </a:fontRef>
+        </p:style>
+        <p:txBody>
+          <a:bodyPr rtlCol="0" anchor="ctr"/>
+          <a:lstStyle/>
+          <a:p>
+            <a:pPr algn="ctr"/>
+            <a:r>
+              <a:rPr lang="en-US" sz="1600" dirty="0">
+                <a:solidFill>
+                  <a:schemeClr val="bg1"/>
+                </a:solidFill>
+              </a:rPr>
+              <a:t>:</a:t>
+            </a:r>
+            <a:r>
+              <a:rPr lang="en-US" sz="1600" dirty="0" err="1">
+                <a:solidFill>
+                  <a:schemeClr val="bg1"/>
+                </a:solidFill>
+              </a:rPr>
+              <a:t>Bcrypt</a:t>
+            </a:r>
+            <a:endParaRPr lang="en-SG" sz="1600" dirty="0">
+              <a:solidFill>
+                <a:schemeClr val="bg1"/>
+              </a:solidFill>
+            </a:endParaRPr>
+          </a:p>
+        </p:txBody>
+      </p:sp>
+      <p:cxnSp>
+        <p:nvCxnSpPr>
+          <p:cNvPr id="63" name="Straight Connector 62">
+            <a:extLst>
+              <a:ext uri="{FF2B5EF4-FFF2-40B4-BE49-F238E27FC236}">
+                <a16:creationId xmlns:a16="http://schemas.microsoft.com/office/drawing/2014/main" id="{4267502B-FAAC-4431-A832-5A2B2C54E962}"/>
+              </a:ext>
+            </a:extLst>
+          </p:cNvPr>
+          <p:cNvCxnSpPr>
+            <a:cxnSpLocks/>
+            <a:stCxn id="62" idx="2"/>
+          </p:cNvCxnSpPr>
+          <p:nvPr/>
+        </p:nvCxnSpPr>
+        <p:spPr>
+          <a:xfrm>
+            <a:off x="2932211" y="3327132"/>
+            <a:ext cx="0" cy="526779"/>
+          </a:xfrm>
+          <a:prstGeom prst="line">
+            <a:avLst/>
+          </a:prstGeom>
+          <a:ln w="9525" cap="flat" cmpd="sng" algn="ctr">
+            <a:solidFill>
+              <a:schemeClr val="accent2"/>
+            </a:solidFill>
+            <a:prstDash val="dash"/>
+            <a:round/>
+            <a:headEnd type="none" w="med" len="med"/>
+            <a:tailEnd type="none" w="med" len="med"/>
+          </a:ln>
+        </p:spPr>
+        <p:style>
+          <a:lnRef idx="0">
+            <a:scrgbClr r="0" g="0" b="0"/>
+          </a:lnRef>
+          <a:fillRef idx="0">
+            <a:scrgbClr r="0" g="0" b="0"/>
+          </a:fillRef>
+          <a:effectRef idx="0">
+            <a:scrgbClr r="0" g="0" b="0"/>
+          </a:effectRef>
+          <a:fontRef idx="minor">
+            <a:schemeClr val="tx1"/>
+          </a:fontRef>
+        </p:style>
+      </p:cxnSp>
+      <p:sp>
+        <p:nvSpPr>
+          <p:cNvPr id="65" name="Rectangle 64">
+            <a:extLst>
+              <a:ext uri="{FF2B5EF4-FFF2-40B4-BE49-F238E27FC236}">
+                <a16:creationId xmlns:a16="http://schemas.microsoft.com/office/drawing/2014/main" id="{7076A03A-D76A-499A-B6E0-C0C1B93D8DF5}"/>
+              </a:ext>
+            </a:extLst>
+          </p:cNvPr>
+          <p:cNvSpPr/>
+          <p:nvPr/>
+        </p:nvSpPr>
+        <p:spPr>
+          <a:xfrm>
+            <a:off x="2871530" y="3484533"/>
+            <a:ext cx="144016" cy="290390"/>
+          </a:xfrm>
+          <a:prstGeom prst="rect">
+            <a:avLst/>
+          </a:prstGeom>
+          <a:solidFill>
+            <a:schemeClr val="accent2"/>
+          </a:solidFill>
+          <a:ln>
+            <a:solidFill>
+              <a:srgbClr val="7030A0"/>
+            </a:solidFill>
+          </a:ln>
+          <a:effectLst/>
+        </p:spPr>
+        <p:style>
+          <a:lnRef idx="1">
+            <a:schemeClr val="accent3"/>
+          </a:lnRef>
+          <a:fillRef idx="2">
+            <a:schemeClr val="accent3"/>
+          </a:fillRef>
+          <a:effectRef idx="1">
+            <a:schemeClr val="accent3"/>
+          </a:effectRef>
+          <a:fontRef idx="minor">
+            <a:schemeClr val="dk1"/>
+          </a:fontRef>
+        </p:style>
+        <p:txBody>
+          <a:bodyPr rtlCol="0" anchor="ctr"/>
+          <a:lstStyle/>
+          <a:p>
+            <a:pPr algn="ctr"/>
+            <a:endParaRPr lang="en-SG" sz="1400">
+              <a:solidFill>
+                <a:schemeClr val="dk1"/>
+              </a:solidFill>
+            </a:endParaRPr>
+          </a:p>
+        </p:txBody>
+      </p:sp>
+      <p:cxnSp>
+        <p:nvCxnSpPr>
+          <p:cNvPr id="67" name="Straight Arrow Connector 66">
+            <a:extLst>
+              <a:ext uri="{FF2B5EF4-FFF2-40B4-BE49-F238E27FC236}">
+                <a16:creationId xmlns:a16="http://schemas.microsoft.com/office/drawing/2014/main" id="{32027BE2-E988-4F22-BD99-1EDBBA552770}"/>
+              </a:ext>
+            </a:extLst>
+          </p:cNvPr>
+          <p:cNvCxnSpPr>
+            <a:cxnSpLocks/>
+            <a:endCxn id="65" idx="0"/>
+          </p:cNvCxnSpPr>
+          <p:nvPr/>
+        </p:nvCxnSpPr>
+        <p:spPr>
+          <a:xfrm>
+            <a:off x="1413854" y="3484218"/>
+            <a:ext cx="1529684" cy="315"/>
+          </a:xfrm>
+          <a:prstGeom prst="straightConnector1">
+            <a:avLst/>
+          </a:prstGeom>
+          <a:ln w="19050">
+            <a:solidFill>
+              <a:srgbClr val="0070C0"/>
+            </a:solidFill>
+            <a:tailEnd type="arrow"/>
+          </a:ln>
+        </p:spPr>
+        <p:style>
+          <a:lnRef idx="1">
+            <a:schemeClr val="accent1"/>
+          </a:lnRef>
+          <a:fillRef idx="0">
+            <a:schemeClr val="accent1"/>
+          </a:fillRef>
+          <a:effectRef idx="0">
+            <a:schemeClr val="accent1"/>
+          </a:effectRef>
+          <a:fontRef idx="minor">
+            <a:schemeClr val="tx1"/>
+          </a:fontRef>
+        </p:style>
+      </p:cxnSp>
+      <p:sp>
+        <p:nvSpPr>
+          <p:cNvPr id="70" name="TextBox 69">
+            <a:extLst>
+              <a:ext uri="{FF2B5EF4-FFF2-40B4-BE49-F238E27FC236}">
+                <a16:creationId xmlns:a16="http://schemas.microsoft.com/office/drawing/2014/main" id="{870C0856-4CDD-4322-8D38-F522165F06B1}"/>
+              </a:ext>
+            </a:extLst>
+          </p:cNvPr>
+          <p:cNvSpPr txBox="1"/>
+          <p:nvPr/>
+        </p:nvSpPr>
+        <p:spPr>
+          <a:xfrm>
+            <a:off x="1530869" y="3308205"/>
+            <a:ext cx="1471675" cy="169277"/>
+          </a:xfrm>
+          <a:prstGeom prst="rect">
+            <a:avLst/>
+          </a:prstGeom>
+          <a:noFill/>
+        </p:spPr>
+        <p:txBody>
+          <a:bodyPr wrap="square" lIns="0" tIns="0" rIns="0" bIns="0" rtlCol="0">
+            <a:spAutoFit/>
+          </a:bodyPr>
+          <a:lstStyle/>
+          <a:p>
+            <a:r>
+              <a:rPr lang="en-US" sz="1100" dirty="0" err="1">
+                <a:solidFill>
+                  <a:schemeClr val="accent2"/>
+                </a:solidFill>
+              </a:rPr>
+              <a:t>checkPW</a:t>
+            </a:r>
+            <a:r>
+              <a:rPr lang="en-US" sz="1100" dirty="0">
+                <a:solidFill>
+                  <a:schemeClr val="accent2"/>
+                </a:solidFill>
+              </a:rPr>
+              <a:t>(hashed, p)</a:t>
+            </a:r>
+          </a:p>
+        </p:txBody>
+      </p:sp>
+      <p:cxnSp>
+        <p:nvCxnSpPr>
+          <p:cNvPr id="71" name="Straight Arrow Connector 70">
+            <a:extLst>
+              <a:ext uri="{FF2B5EF4-FFF2-40B4-BE49-F238E27FC236}">
+                <a16:creationId xmlns:a16="http://schemas.microsoft.com/office/drawing/2014/main" id="{65261206-4B01-473B-A9AC-B7AEED464479}"/>
+              </a:ext>
+            </a:extLst>
+          </p:cNvPr>
+          <p:cNvCxnSpPr>
+            <a:cxnSpLocks/>
+            <a:endCxn id="65" idx="2"/>
+          </p:cNvCxnSpPr>
+          <p:nvPr/>
+        </p:nvCxnSpPr>
+        <p:spPr>
+          <a:xfrm>
+            <a:off x="1464709" y="3774609"/>
+            <a:ext cx="1478829" cy="314"/>
+          </a:xfrm>
+          <a:prstGeom prst="straightConnector1">
+            <a:avLst/>
+          </a:prstGeom>
+          <a:ln w="19050">
+            <a:solidFill>
+              <a:schemeClr val="accent2"/>
+            </a:solidFill>
+            <a:prstDash val="sysDash"/>
+            <a:headEnd type="arrow" w="med" len="med"/>
+            <a:tailEnd type="none" w="med" len="med"/>
+          </a:ln>
+        </p:spPr>
+        <p:style>
+          <a:lnRef idx="1">
+            <a:schemeClr val="accent1"/>
+          </a:lnRef>
+          <a:fillRef idx="0">
+            <a:schemeClr val="accent1"/>
+          </a:fillRef>
+          <a:effectRef idx="0">
+            <a:schemeClr val="accent1"/>
+          </a:effectRef>
+          <a:fontRef idx="minor">
+            <a:schemeClr val="tx1"/>
+          </a:fontRef>
+        </p:style>
+      </p:cxnSp>
+      <p:cxnSp>
+        <p:nvCxnSpPr>
+          <p:cNvPr id="76" name="Straight Arrow Connector 75">
+            <a:extLst>
+              <a:ext uri="{FF2B5EF4-FFF2-40B4-BE49-F238E27FC236}">
+                <a16:creationId xmlns:a16="http://schemas.microsoft.com/office/drawing/2014/main" id="{0B9313CF-6787-41F0-A84B-CA0BBD25775E}"/>
+              </a:ext>
+            </a:extLst>
+          </p:cNvPr>
+          <p:cNvCxnSpPr>
+            <a:cxnSpLocks/>
+          </p:cNvCxnSpPr>
+          <p:nvPr/>
+        </p:nvCxnSpPr>
+        <p:spPr>
+          <a:xfrm flipV="1">
+            <a:off x="1462552" y="4137199"/>
+            <a:ext cx="2124654" cy="28852"/>
+          </a:xfrm>
+          <a:prstGeom prst="straightConnector1">
+            <a:avLst/>
+          </a:prstGeom>
+          <a:ln w="19050">
+            <a:solidFill>
+              <a:srgbClr val="0070C0"/>
+            </a:solidFill>
+            <a:tailEnd type="arrow"/>
+          </a:ln>
+        </p:spPr>
+        <p:style>
+          <a:lnRef idx="1">
+            <a:schemeClr val="accent1"/>
+          </a:lnRef>
+          <a:fillRef idx="0">
+            <a:schemeClr val="accent1"/>
+          </a:fillRef>
+          <a:effectRef idx="0">
+            <a:schemeClr val="accent1"/>
+          </a:effectRef>
+          <a:fontRef idx="minor">
+            <a:schemeClr val="tx1"/>
+          </a:fontRef>
+        </p:style>
+      </p:cxnSp>
+      <p:sp>
+        <p:nvSpPr>
+          <p:cNvPr id="77" name="TextBox 76">
+            <a:extLst>
+              <a:ext uri="{FF2B5EF4-FFF2-40B4-BE49-F238E27FC236}">
+                <a16:creationId xmlns:a16="http://schemas.microsoft.com/office/drawing/2014/main" id="{B00AD8C8-0405-4921-A80A-7AB42FE11FE3}"/>
+              </a:ext>
+            </a:extLst>
+          </p:cNvPr>
+          <p:cNvSpPr txBox="1"/>
+          <p:nvPr/>
+        </p:nvSpPr>
+        <p:spPr>
+          <a:xfrm>
+            <a:off x="1999902" y="2299156"/>
+            <a:ext cx="1505298" cy="215444"/>
+          </a:xfrm>
+          <a:prstGeom prst="rect">
+            <a:avLst/>
+          </a:prstGeom>
+          <a:noFill/>
+        </p:spPr>
+        <p:txBody>
+          <a:bodyPr wrap="square" lIns="0" tIns="0" rIns="0" bIns="0" rtlCol="0">
+            <a:spAutoFit/>
+          </a:bodyPr>
+          <a:lstStyle/>
+          <a:p>
+            <a:r>
+              <a:rPr lang="en-US" sz="1400" dirty="0" err="1">
+                <a:solidFill>
+                  <a:srgbClr val="7030A0"/>
+                </a:solidFill>
+              </a:rPr>
+              <a:t>findAdmin</a:t>
+            </a:r>
+            <a:r>
+              <a:rPr lang="en-US" sz="1400" dirty="0">
+                <a:solidFill>
+                  <a:srgbClr val="7030A0"/>
+                </a:solidFill>
+              </a:rPr>
+              <a:t>(u)</a:t>
+            </a:r>
+          </a:p>
+        </p:txBody>
+      </p:sp>
+      <p:cxnSp>
+        <p:nvCxnSpPr>
+          <p:cNvPr id="81" name="Straight Arrow Connector 80">
+            <a:extLst>
+              <a:ext uri="{FF2B5EF4-FFF2-40B4-BE49-F238E27FC236}">
+                <a16:creationId xmlns:a16="http://schemas.microsoft.com/office/drawing/2014/main" id="{FEB03C75-CC23-4365-94F9-33223A471ABC}"/>
+              </a:ext>
+            </a:extLst>
+          </p:cNvPr>
+          <p:cNvCxnSpPr>
+            <a:cxnSpLocks/>
+          </p:cNvCxnSpPr>
+          <p:nvPr/>
+        </p:nvCxnSpPr>
+        <p:spPr>
+          <a:xfrm>
+            <a:off x="1501623" y="6019800"/>
+            <a:ext cx="1978355" cy="0"/>
+          </a:xfrm>
+          <a:prstGeom prst="straightConnector1">
+            <a:avLst/>
+          </a:prstGeom>
+          <a:ln w="19050">
+            <a:solidFill>
+              <a:srgbClr val="7030A0"/>
+            </a:solidFill>
+            <a:prstDash val="sysDash"/>
+            <a:headEnd type="arrow" w="med" len="med"/>
+            <a:tailEnd type="none" w="med" len="med"/>
+          </a:ln>
+        </p:spPr>
+        <p:style>
+          <a:lnRef idx="1">
+            <a:schemeClr val="accent1"/>
+          </a:lnRef>
+          <a:fillRef idx="0">
+            <a:schemeClr val="accent1"/>
+          </a:fillRef>
+          <a:effectRef idx="0">
+            <a:schemeClr val="accent1"/>
+          </a:effectRef>
+          <a:fontRef idx="minor">
+            <a:schemeClr val="tx1"/>
+          </a:fontRef>
+        </p:style>
+      </p:cxnSp>
+      <p:cxnSp>
+        <p:nvCxnSpPr>
+          <p:cNvPr id="80" name="Straight Arrow Connector 79">
+            <a:extLst>
+              <a:ext uri="{FF2B5EF4-FFF2-40B4-BE49-F238E27FC236}">
+                <a16:creationId xmlns:a16="http://schemas.microsoft.com/office/drawing/2014/main" id="{EF216D0D-724F-400F-B90A-D7250738DB90}"/>
+              </a:ext>
+            </a:extLst>
+          </p:cNvPr>
+          <p:cNvCxnSpPr>
+            <a:cxnSpLocks/>
+          </p:cNvCxnSpPr>
+          <p:nvPr/>
+        </p:nvCxnSpPr>
+        <p:spPr>
+          <a:xfrm flipH="1">
+            <a:off x="4648480" y="5678617"/>
+            <a:ext cx="3222599" cy="0"/>
+          </a:xfrm>
+          <a:prstGeom prst="straightConnector1">
+            <a:avLst/>
+          </a:prstGeom>
+          <a:ln w="19050">
+            <a:solidFill>
+              <a:srgbClr val="00B050"/>
+            </a:solidFill>
+            <a:tailEnd type="arrow"/>
+          </a:ln>
+        </p:spPr>
+        <p:style>
+          <a:lnRef idx="1">
+            <a:schemeClr val="accent1"/>
+          </a:lnRef>
+          <a:fillRef idx="0">
+            <a:schemeClr val="accent1"/>
+          </a:fillRef>
+          <a:effectRef idx="0">
+            <a:schemeClr val="accent1"/>
+          </a:effectRef>
+          <a:fontRef idx="minor">
+            <a:schemeClr val="tx1"/>
+          </a:fontRef>
+        </p:style>
+      </p:cxnSp>
+      <p:sp>
+        <p:nvSpPr>
+          <p:cNvPr id="83" name="TextBox 82">
+            <a:extLst>
+              <a:ext uri="{FF2B5EF4-FFF2-40B4-BE49-F238E27FC236}">
+                <a16:creationId xmlns:a16="http://schemas.microsoft.com/office/drawing/2014/main" id="{F641F5C2-5E9C-4B17-9A85-3CF00AF917A0}"/>
+              </a:ext>
+            </a:extLst>
+          </p:cNvPr>
+          <p:cNvSpPr txBox="1"/>
+          <p:nvPr/>
+        </p:nvSpPr>
+        <p:spPr>
+          <a:xfrm>
+            <a:off x="5109224" y="5509340"/>
+            <a:ext cx="2438400" cy="338554"/>
+          </a:xfrm>
+          <a:prstGeom prst="rect">
+            <a:avLst/>
+          </a:prstGeom>
+          <a:noFill/>
+        </p:spPr>
+        <p:txBody>
+          <a:bodyPr wrap="square" lIns="0" tIns="0" rIns="0" bIns="0" rtlCol="0">
+            <a:spAutoFit/>
+          </a:bodyPr>
+          <a:lstStyle/>
+          <a:p>
+            <a:r>
+              <a:rPr lang="en-US" sz="1100" i="1" dirty="0" err="1">
+                <a:solidFill>
+                  <a:srgbClr val="00B050"/>
+                </a:solidFill>
+              </a:rPr>
+              <a:t>handleAdminLoginEvent</a:t>
+            </a:r>
+            <a:r>
+              <a:rPr lang="en-US" sz="1100" i="1" dirty="0">
+                <a:solidFill>
+                  <a:srgbClr val="00B050"/>
+                </a:solidFill>
+              </a:rPr>
+              <a:t>()</a:t>
+            </a:r>
+            <a:br>
+              <a:rPr lang="en-US" sz="1100" i="1" dirty="0">
+                <a:solidFill>
+                  <a:srgbClr val="00B050"/>
+                </a:solidFill>
+              </a:rPr>
+            </a:br>
+            <a:r>
+              <a:rPr lang="en-US" sz="1100" i="1" dirty="0">
+                <a:solidFill>
+                  <a:srgbClr val="00B050"/>
+                </a:solidFill>
+              </a:rPr>
+              <a:t>changes color of </a:t>
+            </a:r>
+            <a:r>
+              <a:rPr lang="en-US" sz="1100" i="1" dirty="0" err="1">
+                <a:solidFill>
+                  <a:srgbClr val="00B050"/>
+                </a:solidFill>
+              </a:rPr>
+              <a:t>CommandBox</a:t>
+            </a:r>
+            <a:endParaRPr lang="en-US" sz="1100" i="1" dirty="0">
+              <a:solidFill>
+                <a:srgbClr val="00B050"/>
+              </a:solidFill>
+            </a:endParaRPr>
+          </a:p>
+        </p:txBody>
+      </p:sp>
+      <p:sp>
+        <p:nvSpPr>
+          <p:cNvPr id="84" name="Rectangle 62">
+            <a:extLst>
+              <a:ext uri="{FF2B5EF4-FFF2-40B4-BE49-F238E27FC236}">
+                <a16:creationId xmlns:a16="http://schemas.microsoft.com/office/drawing/2014/main" id="{BF3B32E9-D20F-4F6D-A8DE-DEA81B4F756B}"/>
+              </a:ext>
+            </a:extLst>
+          </p:cNvPr>
+          <p:cNvSpPr/>
+          <p:nvPr/>
+        </p:nvSpPr>
+        <p:spPr>
+          <a:xfrm>
+            <a:off x="4551796" y="2775045"/>
+            <a:ext cx="1692703" cy="438800"/>
+          </a:xfrm>
+          <a:prstGeom prst="rect">
+            <a:avLst/>
+          </a:prstGeom>
+          <a:solidFill>
+            <a:srgbClr val="7030A0"/>
+          </a:solidFill>
+          <a:ln w="19050">
+            <a:solidFill>
+              <a:srgbClr val="7030A0"/>
+            </a:solidFill>
+          </a:ln>
+          <a:effectLst/>
+        </p:spPr>
+        <p:style>
+          <a:lnRef idx="1">
+            <a:schemeClr val="accent2"/>
+          </a:lnRef>
+          <a:fillRef idx="2">
+            <a:schemeClr val="accent2"/>
+          </a:fillRef>
+          <a:effectRef idx="1">
+            <a:schemeClr val="accent2"/>
+          </a:effectRef>
+          <a:fontRef idx="minor">
+            <a:schemeClr val="dk1"/>
+          </a:fontRef>
+        </p:style>
+        <p:txBody>
+          <a:bodyPr rtlCol="0" anchor="ctr"/>
+          <a:lstStyle/>
+          <a:p>
+            <a:pPr algn="ctr"/>
+            <a:r>
+              <a:rPr lang="en-US" sz="1200" dirty="0">
+                <a:solidFill>
+                  <a:schemeClr val="bg1"/>
+                </a:solidFill>
+              </a:rPr>
+              <a:t>:</a:t>
+            </a:r>
+            <a:r>
+              <a:rPr lang="en-US" sz="1200" dirty="0" err="1">
+                <a:solidFill>
+                  <a:schemeClr val="bg1"/>
+                </a:solidFill>
+              </a:rPr>
+              <a:t>VersionedAddressBook</a:t>
+            </a:r>
+            <a:endParaRPr lang="en-SG" sz="1200" dirty="0">
+              <a:solidFill>
+                <a:schemeClr val="bg1"/>
+              </a:solidFill>
+            </a:endParaRPr>
+          </a:p>
+        </p:txBody>
+      </p:sp>
+      <p:cxnSp>
+        <p:nvCxnSpPr>
+          <p:cNvPr id="85" name="Straight Connector 84">
+            <a:extLst>
+              <a:ext uri="{FF2B5EF4-FFF2-40B4-BE49-F238E27FC236}">
+                <a16:creationId xmlns:a16="http://schemas.microsoft.com/office/drawing/2014/main" id="{BFB8A462-6E42-48D0-B14F-6A64695F0F4C}"/>
+              </a:ext>
+            </a:extLst>
+          </p:cNvPr>
+          <p:cNvCxnSpPr>
+            <a:cxnSpLocks/>
+          </p:cNvCxnSpPr>
+          <p:nvPr/>
+        </p:nvCxnSpPr>
+        <p:spPr>
+          <a:xfrm>
+            <a:off x="5528252" y="3206017"/>
+            <a:ext cx="28744" cy="1816833"/>
+          </a:xfrm>
+          <a:prstGeom prst="line">
+            <a:avLst/>
+          </a:prstGeom>
+          <a:ln w="19050">
+            <a:solidFill>
+              <a:srgbClr val="7030A0"/>
+            </a:solidFill>
+            <a:prstDash val="sysDash"/>
+          </a:ln>
+          <a:effectLst/>
+        </p:spPr>
+        <p:style>
+          <a:lnRef idx="1">
+            <a:schemeClr val="accent1"/>
+          </a:lnRef>
+          <a:fillRef idx="2">
+            <a:schemeClr val="accent1"/>
+          </a:fillRef>
+          <a:effectRef idx="1">
+            <a:schemeClr val="accent1"/>
+          </a:effectRef>
+          <a:fontRef idx="minor">
+            <a:schemeClr val="dk1"/>
+          </a:fontRef>
+        </p:style>
+      </p:cxnSp>
+      <p:sp>
+        <p:nvSpPr>
+          <p:cNvPr id="88" name="Rectangle 87">
+            <a:extLst>
+              <a:ext uri="{FF2B5EF4-FFF2-40B4-BE49-F238E27FC236}">
+                <a16:creationId xmlns:a16="http://schemas.microsoft.com/office/drawing/2014/main" id="{D54DA00D-CCFF-4DC7-8C91-8D771362F759}"/>
+              </a:ext>
+            </a:extLst>
+          </p:cNvPr>
+          <p:cNvSpPr/>
+          <p:nvPr/>
+        </p:nvSpPr>
+        <p:spPr>
+          <a:xfrm>
+            <a:off x="5478830" y="4161507"/>
+            <a:ext cx="112865" cy="730217"/>
+          </a:xfrm>
+          <a:prstGeom prst="rect">
+            <a:avLst/>
+          </a:prstGeom>
+          <a:solidFill>
+            <a:srgbClr val="7030A0"/>
+          </a:solidFill>
+          <a:ln>
+            <a:solidFill>
+              <a:srgbClr val="7030A0"/>
+            </a:solidFill>
+          </a:ln>
+          <a:effectLst/>
+        </p:spPr>
+        <p:style>
+          <a:lnRef idx="1">
+            <a:schemeClr val="accent3"/>
+          </a:lnRef>
+          <a:fillRef idx="2">
+            <a:schemeClr val="accent3"/>
+          </a:fillRef>
+          <a:effectRef idx="1">
+            <a:schemeClr val="accent3"/>
+          </a:effectRef>
+          <a:fontRef idx="minor">
+            <a:schemeClr val="dk1"/>
+          </a:fontRef>
+        </p:style>
+        <p:txBody>
+          <a:bodyPr rtlCol="0" anchor="ctr"/>
+          <a:lstStyle/>
+          <a:p>
+            <a:pPr algn="ctr"/>
+            <a:endParaRPr lang="en-SG" sz="1400">
+              <a:solidFill>
+                <a:schemeClr val="dk1"/>
+              </a:solidFill>
+            </a:endParaRPr>
+          </a:p>
+        </p:txBody>
+      </p:sp>
+      <p:cxnSp>
+        <p:nvCxnSpPr>
+          <p:cNvPr id="89" name="Straight Arrow Connector 88">
+            <a:extLst>
+              <a:ext uri="{FF2B5EF4-FFF2-40B4-BE49-F238E27FC236}">
+                <a16:creationId xmlns:a16="http://schemas.microsoft.com/office/drawing/2014/main" id="{106C3267-E38B-45E1-85E1-7CD21A5F77CD}"/>
+              </a:ext>
+            </a:extLst>
+          </p:cNvPr>
+          <p:cNvCxnSpPr>
+            <a:cxnSpLocks/>
+          </p:cNvCxnSpPr>
+          <p:nvPr/>
+        </p:nvCxnSpPr>
+        <p:spPr>
+          <a:xfrm flipV="1">
+            <a:off x="3693714" y="4161485"/>
+            <a:ext cx="1841548" cy="9131"/>
+          </a:xfrm>
+          <a:prstGeom prst="straightConnector1">
+            <a:avLst/>
+          </a:prstGeom>
+          <a:ln w="19050">
+            <a:solidFill>
+              <a:schemeClr val="accent4"/>
+            </a:solidFill>
+            <a:tailEnd type="arrow"/>
+          </a:ln>
+        </p:spPr>
+        <p:style>
+          <a:lnRef idx="1">
+            <a:schemeClr val="accent1"/>
+          </a:lnRef>
+          <a:fillRef idx="0">
+            <a:schemeClr val="accent1"/>
+          </a:fillRef>
+          <a:effectRef idx="0">
+            <a:schemeClr val="accent1"/>
+          </a:effectRef>
+          <a:fontRef idx="minor">
+            <a:schemeClr val="tx1"/>
+          </a:fontRef>
+        </p:style>
+      </p:cxnSp>
+      <p:cxnSp>
+        <p:nvCxnSpPr>
+          <p:cNvPr id="92" name="Straight Arrow Connector 91">
+            <a:extLst>
+              <a:ext uri="{FF2B5EF4-FFF2-40B4-BE49-F238E27FC236}">
+                <a16:creationId xmlns:a16="http://schemas.microsoft.com/office/drawing/2014/main" id="{E5013156-C166-40B3-8552-3A9786211003}"/>
+              </a:ext>
+            </a:extLst>
+          </p:cNvPr>
+          <p:cNvCxnSpPr>
+            <a:cxnSpLocks/>
+          </p:cNvCxnSpPr>
+          <p:nvPr/>
+        </p:nvCxnSpPr>
+        <p:spPr>
+          <a:xfrm>
+            <a:off x="3681319" y="4891724"/>
+            <a:ext cx="1797511" cy="0"/>
+          </a:xfrm>
+          <a:prstGeom prst="straightConnector1">
+            <a:avLst/>
+          </a:prstGeom>
+          <a:ln w="19050">
+            <a:solidFill>
+              <a:srgbClr val="7030A0"/>
+            </a:solidFill>
+            <a:prstDash val="sysDash"/>
+            <a:headEnd type="arrow" w="med" len="med"/>
+            <a:tailEnd type="none" w="med" len="med"/>
+          </a:ln>
+        </p:spPr>
+        <p:style>
+          <a:lnRef idx="1">
+            <a:schemeClr val="accent1"/>
+          </a:lnRef>
+          <a:fillRef idx="0">
+            <a:schemeClr val="accent1"/>
+          </a:fillRef>
+          <a:effectRef idx="0">
+            <a:schemeClr val="accent1"/>
+          </a:effectRef>
+          <a:fontRef idx="minor">
+            <a:schemeClr val="tx1"/>
+          </a:fontRef>
+        </p:style>
+      </p:cxnSp>
+      <p:sp>
+        <p:nvSpPr>
+          <p:cNvPr id="95" name="Rectangle 62">
+            <a:extLst>
+              <a:ext uri="{FF2B5EF4-FFF2-40B4-BE49-F238E27FC236}">
+                <a16:creationId xmlns:a16="http://schemas.microsoft.com/office/drawing/2014/main" id="{BA318FEE-6FD7-4D03-ADA2-C7111325FDED}"/>
+              </a:ext>
+            </a:extLst>
+          </p:cNvPr>
+          <p:cNvSpPr/>
+          <p:nvPr/>
+        </p:nvSpPr>
+        <p:spPr>
+          <a:xfrm>
+            <a:off x="6292736" y="3289535"/>
+            <a:ext cx="1163053" cy="438800"/>
+          </a:xfrm>
+          <a:prstGeom prst="rect">
+            <a:avLst/>
+          </a:prstGeom>
+          <a:solidFill>
+            <a:srgbClr val="7030A0"/>
+          </a:solidFill>
+          <a:ln w="19050">
+            <a:solidFill>
+              <a:srgbClr val="7030A0"/>
+            </a:solidFill>
+          </a:ln>
+          <a:effectLst/>
+        </p:spPr>
+        <p:style>
+          <a:lnRef idx="1">
+            <a:schemeClr val="accent2"/>
+          </a:lnRef>
+          <a:fillRef idx="2">
+            <a:schemeClr val="accent2"/>
+          </a:fillRef>
+          <a:effectRef idx="1">
+            <a:schemeClr val="accent2"/>
+          </a:effectRef>
+          <a:fontRef idx="minor">
+            <a:schemeClr val="dk1"/>
+          </a:fontRef>
+        </p:style>
+        <p:txBody>
+          <a:bodyPr rtlCol="0" anchor="ctr"/>
+          <a:lstStyle/>
+          <a:p>
+            <a:pPr algn="ctr"/>
+            <a:r>
+              <a:rPr lang="en-US" sz="1200" dirty="0">
+                <a:solidFill>
+                  <a:schemeClr val="bg1"/>
+                </a:solidFill>
+              </a:rPr>
+              <a:t>:</a:t>
+            </a:r>
+            <a:r>
+              <a:rPr lang="en-US" sz="1200" dirty="0" err="1">
+                <a:solidFill>
+                  <a:schemeClr val="bg1"/>
+                </a:solidFill>
+              </a:rPr>
+              <a:t>AdminSession</a:t>
+            </a:r>
+            <a:endParaRPr lang="en-SG" sz="1200" dirty="0">
+              <a:solidFill>
+                <a:schemeClr val="bg1"/>
+              </a:solidFill>
+            </a:endParaRPr>
+          </a:p>
+        </p:txBody>
+      </p:sp>
+      <p:sp>
+        <p:nvSpPr>
+          <p:cNvPr id="97" name="Rectangle 96">
+            <a:extLst>
+              <a:ext uri="{FF2B5EF4-FFF2-40B4-BE49-F238E27FC236}">
+                <a16:creationId xmlns:a16="http://schemas.microsoft.com/office/drawing/2014/main" id="{FC2215BE-A1DE-4A5B-B8A4-1190765A61D4}"/>
+              </a:ext>
+            </a:extLst>
+          </p:cNvPr>
+          <p:cNvSpPr/>
+          <p:nvPr/>
+        </p:nvSpPr>
+        <p:spPr>
+          <a:xfrm>
+            <a:off x="6815775" y="4216949"/>
+            <a:ext cx="118425" cy="431251"/>
+          </a:xfrm>
+          <a:prstGeom prst="rect">
+            <a:avLst/>
+          </a:prstGeom>
+          <a:solidFill>
+            <a:srgbClr val="7030A0"/>
+          </a:solidFill>
+          <a:ln>
+            <a:solidFill>
+              <a:srgbClr val="7030A0"/>
+            </a:solidFill>
+          </a:ln>
+          <a:effectLst/>
+        </p:spPr>
+        <p:style>
+          <a:lnRef idx="1">
+            <a:schemeClr val="accent3"/>
+          </a:lnRef>
+          <a:fillRef idx="2">
+            <a:schemeClr val="accent3"/>
+          </a:fillRef>
+          <a:effectRef idx="1">
+            <a:schemeClr val="accent3"/>
+          </a:effectRef>
+          <a:fontRef idx="minor">
+            <a:schemeClr val="dk1"/>
+          </a:fontRef>
+        </p:style>
+        <p:txBody>
+          <a:bodyPr rtlCol="0" anchor="ctr"/>
+          <a:lstStyle/>
+          <a:p>
+            <a:pPr algn="ctr"/>
+            <a:endParaRPr lang="en-SG" sz="1400">
+              <a:solidFill>
+                <a:schemeClr val="dk1"/>
+              </a:solidFill>
+            </a:endParaRPr>
+          </a:p>
+        </p:txBody>
+      </p:sp>
+      <p:cxnSp>
+        <p:nvCxnSpPr>
+          <p:cNvPr id="98" name="Straight Connector 97">
+            <a:extLst>
+              <a:ext uri="{FF2B5EF4-FFF2-40B4-BE49-F238E27FC236}">
+                <a16:creationId xmlns:a16="http://schemas.microsoft.com/office/drawing/2014/main" id="{4F42B28D-4798-4C4B-BE7C-66E640C89B67}"/>
+              </a:ext>
+            </a:extLst>
+          </p:cNvPr>
+          <p:cNvCxnSpPr>
+            <a:cxnSpLocks/>
+          </p:cNvCxnSpPr>
+          <p:nvPr/>
+        </p:nvCxnSpPr>
+        <p:spPr>
+          <a:xfrm>
+            <a:off x="6874262" y="3694365"/>
+            <a:ext cx="0" cy="1094603"/>
+          </a:xfrm>
+          <a:prstGeom prst="line">
+            <a:avLst/>
+          </a:prstGeom>
+          <a:ln w="19050">
+            <a:solidFill>
+              <a:srgbClr val="7030A0"/>
+            </a:solidFill>
+            <a:prstDash val="sysDash"/>
+          </a:ln>
+          <a:effectLst/>
+        </p:spPr>
+        <p:style>
+          <a:lnRef idx="1">
+            <a:schemeClr val="accent1"/>
+          </a:lnRef>
+          <a:fillRef idx="2">
+            <a:schemeClr val="accent1"/>
+          </a:fillRef>
+          <a:effectRef idx="1">
+            <a:schemeClr val="accent1"/>
+          </a:effectRef>
+          <a:fontRef idx="minor">
+            <a:schemeClr val="dk1"/>
+          </a:fontRef>
+        </p:style>
+      </p:cxnSp>
+      <p:cxnSp>
+        <p:nvCxnSpPr>
+          <p:cNvPr id="100" name="Straight Arrow Connector 99">
+            <a:extLst>
+              <a:ext uri="{FF2B5EF4-FFF2-40B4-BE49-F238E27FC236}">
+                <a16:creationId xmlns:a16="http://schemas.microsoft.com/office/drawing/2014/main" id="{75320C91-18AF-4A26-AFCC-59CE3BB7A759}"/>
+              </a:ext>
+            </a:extLst>
+          </p:cNvPr>
+          <p:cNvCxnSpPr>
+            <a:cxnSpLocks/>
+          </p:cNvCxnSpPr>
+          <p:nvPr/>
+        </p:nvCxnSpPr>
+        <p:spPr>
+          <a:xfrm flipV="1">
+            <a:off x="5553242" y="4213895"/>
+            <a:ext cx="1328528" cy="14568"/>
+          </a:xfrm>
+          <a:prstGeom prst="straightConnector1">
+            <a:avLst/>
+          </a:prstGeom>
+          <a:ln w="19050">
+            <a:solidFill>
+              <a:schemeClr val="accent4"/>
+            </a:solidFill>
+            <a:tailEnd type="arrow"/>
+          </a:ln>
+        </p:spPr>
+        <p:style>
+          <a:lnRef idx="1">
+            <a:schemeClr val="accent1"/>
+          </a:lnRef>
+          <a:fillRef idx="0">
+            <a:schemeClr val="accent1"/>
+          </a:fillRef>
+          <a:effectRef idx="0">
+            <a:schemeClr val="accent1"/>
+          </a:effectRef>
+          <a:fontRef idx="minor">
+            <a:schemeClr val="tx1"/>
+          </a:fontRef>
+        </p:style>
+      </p:cxnSp>
+      <p:cxnSp>
+        <p:nvCxnSpPr>
+          <p:cNvPr id="102" name="Straight Arrow Connector 101">
+            <a:extLst>
+              <a:ext uri="{FF2B5EF4-FFF2-40B4-BE49-F238E27FC236}">
+                <a16:creationId xmlns:a16="http://schemas.microsoft.com/office/drawing/2014/main" id="{D1D0C9C8-9D43-4E35-893A-A5BC465223D7}"/>
+              </a:ext>
+            </a:extLst>
+          </p:cNvPr>
+          <p:cNvCxnSpPr>
+            <a:cxnSpLocks/>
+          </p:cNvCxnSpPr>
+          <p:nvPr/>
+        </p:nvCxnSpPr>
+        <p:spPr>
+          <a:xfrm>
+            <a:off x="5553242" y="4648200"/>
+            <a:ext cx="1274071" cy="0"/>
+          </a:xfrm>
+          <a:prstGeom prst="straightConnector1">
+            <a:avLst/>
+          </a:prstGeom>
+          <a:ln w="19050">
+            <a:solidFill>
+              <a:srgbClr val="7030A0"/>
+            </a:solidFill>
+            <a:prstDash val="sysDash"/>
+            <a:headEnd type="arrow" w="med" len="med"/>
+            <a:tailEnd type="none" w="med" len="med"/>
+          </a:ln>
+        </p:spPr>
+        <p:style>
+          <a:lnRef idx="1">
+            <a:schemeClr val="accent1"/>
+          </a:lnRef>
+          <a:fillRef idx="0">
+            <a:schemeClr val="accent1"/>
+          </a:fillRef>
+          <a:effectRef idx="0">
+            <a:schemeClr val="accent1"/>
+          </a:effectRef>
+          <a:fontRef idx="minor">
+            <a:schemeClr val="tx1"/>
+          </a:fontRef>
+        </p:style>
+      </p:cxnSp>
+      <p:sp>
+        <p:nvSpPr>
+          <p:cNvPr id="104" name="TextBox 103">
+            <a:extLst>
+              <a:ext uri="{FF2B5EF4-FFF2-40B4-BE49-F238E27FC236}">
+                <a16:creationId xmlns:a16="http://schemas.microsoft.com/office/drawing/2014/main" id="{C1959156-BA00-459A-BE8B-4DCBE4D1F587}"/>
+              </a:ext>
+            </a:extLst>
+          </p:cNvPr>
+          <p:cNvSpPr txBox="1"/>
+          <p:nvPr/>
+        </p:nvSpPr>
+        <p:spPr>
+          <a:xfrm>
+            <a:off x="3806096" y="3956258"/>
+            <a:ext cx="1505298" cy="169277"/>
+          </a:xfrm>
+          <a:prstGeom prst="rect">
+            <a:avLst/>
+          </a:prstGeom>
+          <a:noFill/>
+        </p:spPr>
+        <p:txBody>
+          <a:bodyPr wrap="square" lIns="0" tIns="0" rIns="0" bIns="0" rtlCol="0">
+            <a:spAutoFit/>
+          </a:bodyPr>
+          <a:lstStyle/>
+          <a:p>
+            <a:r>
+              <a:rPr lang="en-US" sz="1100" dirty="0" err="1">
+                <a:solidFill>
+                  <a:srgbClr val="7030A0"/>
+                </a:solidFill>
+              </a:rPr>
+              <a:t>setLoggedInAdmin</a:t>
+            </a:r>
+            <a:r>
+              <a:rPr lang="en-US" sz="1100" dirty="0">
+                <a:solidFill>
+                  <a:srgbClr val="7030A0"/>
+                </a:solidFill>
+              </a:rPr>
+              <a:t>(admin)</a:t>
+            </a:r>
+          </a:p>
+        </p:txBody>
+      </p:sp>
+      <p:sp>
+        <p:nvSpPr>
+          <p:cNvPr id="108" name="TextBox 107">
+            <a:extLst>
+              <a:ext uri="{FF2B5EF4-FFF2-40B4-BE49-F238E27FC236}">
+                <a16:creationId xmlns:a16="http://schemas.microsoft.com/office/drawing/2014/main" id="{D50485CB-39E7-4702-9828-C618011E6EE1}"/>
+              </a:ext>
+            </a:extLst>
+          </p:cNvPr>
+          <p:cNvSpPr txBox="1"/>
+          <p:nvPr/>
+        </p:nvSpPr>
+        <p:spPr>
+          <a:xfrm>
+            <a:off x="1566571" y="2647952"/>
+            <a:ext cx="2077695" cy="169277"/>
+          </a:xfrm>
+          <a:prstGeom prst="rect">
+            <a:avLst/>
+          </a:prstGeom>
+          <a:noFill/>
+        </p:spPr>
+        <p:txBody>
+          <a:bodyPr wrap="square" lIns="0" tIns="0" rIns="0" bIns="0" rtlCol="0">
+            <a:spAutoFit/>
+          </a:bodyPr>
+          <a:lstStyle/>
+          <a:p>
+            <a:r>
+              <a:rPr lang="en-US" sz="1100" dirty="0">
+                <a:solidFill>
+                  <a:srgbClr val="7030A0"/>
+                </a:solidFill>
+              </a:rPr>
+              <a:t>Returns “admin” with username u</a:t>
+            </a:r>
+          </a:p>
+        </p:txBody>
+      </p:sp>
+      <p:sp>
+        <p:nvSpPr>
+          <p:cNvPr id="110" name="TextBox 109">
+            <a:extLst>
+              <a:ext uri="{FF2B5EF4-FFF2-40B4-BE49-F238E27FC236}">
+                <a16:creationId xmlns:a16="http://schemas.microsoft.com/office/drawing/2014/main" id="{83602929-2F1B-471A-9BD6-149E853651C7}"/>
+              </a:ext>
+            </a:extLst>
+          </p:cNvPr>
+          <p:cNvSpPr txBox="1"/>
+          <p:nvPr/>
+        </p:nvSpPr>
+        <p:spPr>
+          <a:xfrm>
+            <a:off x="1795950" y="3618262"/>
+            <a:ext cx="977226" cy="169277"/>
+          </a:xfrm>
+          <a:prstGeom prst="rect">
+            <a:avLst/>
+          </a:prstGeom>
+          <a:noFill/>
+        </p:spPr>
+        <p:txBody>
+          <a:bodyPr wrap="square" lIns="0" tIns="0" rIns="0" bIns="0" rtlCol="0">
+            <a:spAutoFit/>
+          </a:bodyPr>
+          <a:lstStyle/>
+          <a:p>
+            <a:r>
+              <a:rPr lang="en-US" sz="1100" dirty="0">
+                <a:solidFill>
+                  <a:schemeClr val="accent2"/>
+                </a:solidFill>
+              </a:rPr>
+              <a:t>Matches/not</a:t>
+            </a:r>
+          </a:p>
+        </p:txBody>
+      </p:sp>
+      <p:sp>
+        <p:nvSpPr>
+          <p:cNvPr id="111" name="TextBox 110">
+            <a:extLst>
+              <a:ext uri="{FF2B5EF4-FFF2-40B4-BE49-F238E27FC236}">
+                <a16:creationId xmlns:a16="http://schemas.microsoft.com/office/drawing/2014/main" id="{A91A8C43-0C5F-4978-80AF-55FD9D2A6005}"/>
+              </a:ext>
+            </a:extLst>
+          </p:cNvPr>
+          <p:cNvSpPr txBox="1"/>
+          <p:nvPr/>
+        </p:nvSpPr>
+        <p:spPr>
+          <a:xfrm>
+            <a:off x="5704927" y="4024373"/>
+            <a:ext cx="1505298" cy="169277"/>
+          </a:xfrm>
+          <a:prstGeom prst="rect">
+            <a:avLst/>
+          </a:prstGeom>
+          <a:noFill/>
+        </p:spPr>
+        <p:txBody>
+          <a:bodyPr wrap="square" lIns="0" tIns="0" rIns="0" bIns="0" rtlCol="0">
+            <a:spAutoFit/>
+          </a:bodyPr>
+          <a:lstStyle/>
+          <a:p>
+            <a:r>
+              <a:rPr lang="en-US" sz="1100" dirty="0" err="1">
+                <a:solidFill>
+                  <a:srgbClr val="7030A0"/>
+                </a:solidFill>
+              </a:rPr>
+              <a:t>setLogin</a:t>
+            </a:r>
+            <a:r>
+              <a:rPr lang="en-US" sz="1100" dirty="0">
+                <a:solidFill>
+                  <a:srgbClr val="7030A0"/>
+                </a:solidFill>
+              </a:rPr>
+              <a:t>(admin)</a:t>
+            </a:r>
+          </a:p>
+        </p:txBody>
+      </p:sp>
+      <p:cxnSp>
+        <p:nvCxnSpPr>
+          <p:cNvPr id="120" name="Straight Arrow Connector 119">
+            <a:extLst>
+              <a:ext uri="{FF2B5EF4-FFF2-40B4-BE49-F238E27FC236}">
+                <a16:creationId xmlns:a16="http://schemas.microsoft.com/office/drawing/2014/main" id="{3CB4EE94-956A-42D8-B205-F9B2916345C7}"/>
+              </a:ext>
+            </a:extLst>
+          </p:cNvPr>
+          <p:cNvCxnSpPr>
+            <a:cxnSpLocks/>
+          </p:cNvCxnSpPr>
+          <p:nvPr/>
+        </p:nvCxnSpPr>
+        <p:spPr>
+          <a:xfrm>
+            <a:off x="76200" y="6095992"/>
+            <a:ext cx="1236809" cy="0"/>
+          </a:xfrm>
+          <a:prstGeom prst="straightConnector1">
+            <a:avLst/>
+          </a:prstGeom>
+          <a:ln w="19050">
+            <a:solidFill>
+              <a:srgbClr val="00B050"/>
+            </a:solidFill>
+            <a:prstDash val="sysDash"/>
+            <a:headEnd type="arrow" w="med" len="med"/>
+            <a:tailEnd type="none" w="med" len="med"/>
+          </a:ln>
+        </p:spPr>
+        <p:style>
+          <a:lnRef idx="1">
+            <a:schemeClr val="accent1"/>
+          </a:lnRef>
+          <a:fillRef idx="0">
+            <a:schemeClr val="accent1"/>
+          </a:fillRef>
+          <a:effectRef idx="0">
+            <a:schemeClr val="accent1"/>
+          </a:effectRef>
+          <a:fontRef idx="minor">
+            <a:schemeClr val="tx1"/>
+          </a:fontRef>
+        </p:style>
+      </p:cxnSp>
+    </p:spTree>
+    <p:extLst>
+      <p:ext uri="{BB962C8B-B14F-4D97-AF65-F5344CB8AC3E}">
+        <p14:creationId xmlns:p14="http://schemas.microsoft.com/office/powerpoint/2010/main" val="985001601"/>
       </p:ext>
     </p:extLst>
   </p:cSld>

</xml_diff>